<commit_message>
added new reaction game
</commit_message>
<xml_diff>
--- a/Philadelphia Code Camp.pptx
+++ b/Philadelphia Code Camp.pptx
@@ -38,7 +38,7 @@
     <p:sldId id="264" r:id="rId32"/>
     <p:sldId id="267" r:id="rId33"/>
     <p:sldId id="308" r:id="rId34"/>
-    <p:sldId id="266" r:id="rId35"/>
+    <p:sldId id="310" r:id="rId35"/>
     <p:sldId id="277" r:id="rId36"/>
     <p:sldId id="278" r:id="rId37"/>
     <p:sldId id="269" r:id="rId38"/>
@@ -56,6 +56,7 @@
     <p:sldId id="284" r:id="rId50"/>
     <p:sldId id="285" r:id="rId51"/>
     <p:sldId id="286" r:id="rId52"/>
+    <p:sldId id="266" r:id="rId53"/>
   </p:sldIdLst>
   <p:sldSz cx="12192000" cy="6858000"/>
   <p:notesSz cx="6858000" cy="9144000"/>
@@ -212,7 +213,11 @@
             <p14:sldId id="264"/>
             <p14:sldId id="267"/>
             <p14:sldId id="308"/>
-            <p14:sldId id="266"/>
+          </p14:sldIdLst>
+        </p14:section>
+        <p14:section name="Lesson 4 - Reaction Game" id="{975F73E2-8A1C-4B74-ABB0-5FB27927F8F1}">
+          <p14:sldIdLst>
+            <p14:sldId id="310"/>
             <p14:sldId id="277"/>
             <p14:sldId id="278"/>
             <p14:sldId id="269"/>
@@ -231,6 +236,17 @@
             <p14:sldId id="285"/>
             <p14:sldId id="286"/>
           </p14:sldIdLst>
+        </p14:section>
+        <p14:section name="Lesson 5 - Traffic Lights" id="{1A1D589F-A0A0-4C42-A5AE-6F610DE43B7A}">
+          <p14:sldIdLst>
+            <p14:sldId id="266"/>
+          </p14:sldIdLst>
+        </p14:section>
+        <p14:section name="Lesson 6 - Laser Trip Wire" id="{7A2AD9E3-1919-418B-9E20-85CE879CA720}">
+          <p14:sldIdLst/>
+        </p14:section>
+        <p14:section name="Lesson 7 - Drone Car" id="{ED7258B8-CAC7-4C2D-AB65-3CC3C6C419D6}">
+          <p14:sldIdLst/>
         </p14:section>
       </p14:sectionLst>
     </p:ext>
@@ -8400,6 +8416,36 @@
           <a:chExt cx="0" cy="0"/>
         </a:xfrm>
       </p:grpSpPr>
+      <p:pic>
+        <p:nvPicPr>
+          <p:cNvPr id="2052" name="Picture 2" descr="https://www.raspberrypi.org/learning/python-quick-reaction-game/images/quick-reaction-circuit.png"/>
+          <p:cNvPicPr>
+            <a:picLocks noChangeAspect="1"/>
+          </p:cNvPicPr>
+          <p:nvPr/>
+        </p:nvPicPr>
+        <p:blipFill rotWithShape="1">
+          <a:blip r:embed="rId2">
+            <a:extLst>
+              <a:ext uri="{28A0092B-C50C-407E-A947-70E740481C1C}">
+                <a14:useLocalDpi xmlns:a14="http://schemas.microsoft.com/office/drawing/2010/main" val="0"/>
+              </a:ext>
+            </a:extLst>
+          </a:blip>
+          <a:srcRect t="3622" r="-2" b="3009"/>
+          <a:stretch/>
+        </p:blipFill>
+        <p:spPr>
+          <a:xfrm>
+            <a:off x="4639056" y="10"/>
+            <a:ext cx="7552944" cy="6857990"/>
+          </a:xfrm>
+          <a:prstGeom prst="rect">
+            <a:avLst/>
+          </a:prstGeom>
+          <a:effectLst/>
+        </p:spPr>
+      </p:pic>
       <p:sp>
         <p:nvSpPr>
           <p:cNvPr id="2" name="Title 1"/>
@@ -8410,50 +8456,544 @@
             <p:ph type="title"/>
           </p:nvPr>
         </p:nvSpPr>
-        <p:spPr/>
-        <p:txBody>
-          <a:bodyPr/>
-          <a:lstStyle/>
-          <a:p>
-            <a:r>
-              <a:rPr lang="en-US" dirty="0"/>
-              <a:t>LED Project Node Red Project</a:t>
-            </a:r>
-          </a:p>
-        </p:txBody>
-      </p:sp>
-      <p:sp>
-        <p:nvSpPr>
-          <p:cNvPr id="3" name="Content Placeholder 2"/>
-          <p:cNvSpPr>
-            <a:spLocks noGrp="1"/>
-          </p:cNvSpPr>
+        <p:spPr>
+          <a:xfrm>
+            <a:off x="648929" y="629266"/>
+            <a:ext cx="3651467" cy="1676603"/>
+          </a:xfrm>
+        </p:spPr>
+        <p:txBody>
+          <a:bodyPr>
+            <a:normAutofit/>
+          </a:bodyPr>
+          <a:lstStyle/>
+          <a:p>
+            <a:r>
+              <a:rPr lang="en-US" dirty="0"/>
+              <a:t>Reaction Game</a:t>
+            </a:r>
+          </a:p>
+        </p:txBody>
+      </p:sp>
+      <p:graphicFrame>
+        <p:nvGraphicFramePr>
+          <p:cNvPr id="7" name="Content Placeholder 3"/>
+          <p:cNvGraphicFramePr>
+            <a:graphicFrameLocks noGrp="1"/>
+          </p:cNvGraphicFramePr>
           <p:nvPr>
             <p:ph idx="1"/>
-          </p:nvPr>
-        </p:nvSpPr>
-        <p:spPr/>
-        <p:txBody>
-          <a:bodyPr/>
-          <a:lstStyle/>
-          <a:p>
-            <a:r>
-              <a:rPr lang="en-US" dirty="0">
-                <a:hlinkClick r:id="rId2"/>
-              </a:rPr>
-              <a:t>https://www.raspberrypi.org/learning/getting-started-with-node-red/worksheet/</a:t>
-            </a:r>
-            <a:endParaRPr lang="en-US" dirty="0"/>
-          </a:p>
-          <a:p>
-            <a:endParaRPr lang="en-US" dirty="0"/>
-          </a:p>
-        </p:txBody>
-      </p:sp>
+            <p:extLst>
+              <p:ext uri="{D42A27DB-BD31-4B8C-83A1-F6EECF244321}">
+                <p14:modId xmlns:p14="http://schemas.microsoft.com/office/powerpoint/2010/main" val="2200899781"/>
+              </p:ext>
+            </p:extLst>
+          </p:nvPr>
+        </p:nvGraphicFramePr>
+        <p:xfrm>
+          <a:off x="649288" y="2841520"/>
+          <a:ext cx="3023060" cy="1309912"/>
+        </p:xfrm>
+        <a:graphic>
+          <a:graphicData uri="http://schemas.openxmlformats.org/drawingml/2006/table">
+            <a:tbl>
+              <a:tblPr/>
+              <a:tblGrid>
+                <a:gridCol w="1511530">
+                  <a:extLst>
+                    <a:ext uri="{9D8B030D-6E8A-4147-A177-3AD203B41FA5}">
+                      <a16:colId xmlns:a16="http://schemas.microsoft.com/office/drawing/2014/main" val="3764869724"/>
+                    </a:ext>
+                  </a:extLst>
+                </a:gridCol>
+                <a:gridCol w="1511530">
+                  <a:extLst>
+                    <a:ext uri="{9D8B030D-6E8A-4147-A177-3AD203B41FA5}">
+                      <a16:colId xmlns:a16="http://schemas.microsoft.com/office/drawing/2014/main" val="2130788667"/>
+                    </a:ext>
+                  </a:extLst>
+                </a:gridCol>
+              </a:tblGrid>
+              <a:tr h="307293">
+                <a:tc>
+                  <a:txBody>
+                    <a:bodyPr/>
+                    <a:lstStyle/>
+                    <a:p>
+                      <a:r>
+                        <a:rPr lang="en-US" sz="2000" b="1">
+                          <a:effectLst/>
+                        </a:rPr>
+                        <a:t>Component</a:t>
+                      </a:r>
+                    </a:p>
+                  </a:txBody>
+                  <a:tcPr marL="24568" marR="24568" marT="11339" marB="11339" anchor="ctr">
+                    <a:lnL w="5443" cap="flat" cmpd="sng" algn="ctr">
+                      <a:solidFill>
+                        <a:srgbClr val="DDDDDD"/>
+                      </a:solidFill>
+                      <a:prstDash val="solid"/>
+                      <a:round/>
+                      <a:headEnd type="none" w="med" len="med"/>
+                      <a:tailEnd type="none" w="med" len="med"/>
+                    </a:lnL>
+                    <a:lnR w="5443" cap="flat" cmpd="sng" algn="ctr">
+                      <a:solidFill>
+                        <a:srgbClr val="DDDDDD"/>
+                      </a:solidFill>
+                      <a:prstDash val="solid"/>
+                      <a:round/>
+                      <a:headEnd type="none" w="med" len="med"/>
+                      <a:tailEnd type="none" w="med" len="med"/>
+                    </a:lnR>
+                    <a:lnT w="5443" cap="flat" cmpd="sng" algn="ctr">
+                      <a:solidFill>
+                        <a:srgbClr val="DDDDDD"/>
+                      </a:solidFill>
+                      <a:prstDash val="solid"/>
+                      <a:round/>
+                      <a:headEnd type="none" w="med" len="med"/>
+                      <a:tailEnd type="none" w="med" len="med"/>
+                    </a:lnT>
+                    <a:lnB w="5443" cap="flat" cmpd="sng" algn="ctr">
+                      <a:solidFill>
+                        <a:srgbClr val="DDDDDD"/>
+                      </a:solidFill>
+                      <a:prstDash val="solid"/>
+                      <a:round/>
+                      <a:headEnd type="none" w="med" len="med"/>
+                      <a:tailEnd type="none" w="med" len="med"/>
+                    </a:lnB>
+                    <a:solidFill>
+                      <a:srgbClr val="FFFFFF"/>
+                    </a:solidFill>
+                  </a:tcPr>
+                </a:tc>
+                <a:tc>
+                  <a:txBody>
+                    <a:bodyPr/>
+                    <a:lstStyle/>
+                    <a:p>
+                      <a:pPr algn="ctr"/>
+                      <a:r>
+                        <a:rPr lang="en-US" sz="2000" b="1" dirty="0">
+                          <a:effectLst/>
+                        </a:rPr>
+                        <a:t>GPIO pin</a:t>
+                      </a:r>
+                    </a:p>
+                  </a:txBody>
+                  <a:tcPr marL="24568" marR="24568" marT="11339" marB="11339" anchor="ctr">
+                    <a:lnL w="5443" cap="flat" cmpd="sng" algn="ctr">
+                      <a:solidFill>
+                        <a:srgbClr val="DDDDDD"/>
+                      </a:solidFill>
+                      <a:prstDash val="solid"/>
+                      <a:round/>
+                      <a:headEnd type="none" w="med" len="med"/>
+                      <a:tailEnd type="none" w="med" len="med"/>
+                    </a:lnL>
+                    <a:lnR w="5443" cap="flat" cmpd="sng" algn="ctr">
+                      <a:solidFill>
+                        <a:srgbClr val="DDDDDD"/>
+                      </a:solidFill>
+                      <a:prstDash val="solid"/>
+                      <a:round/>
+                      <a:headEnd type="none" w="med" len="med"/>
+                      <a:tailEnd type="none" w="med" len="med"/>
+                    </a:lnR>
+                    <a:lnT w="5443" cap="flat" cmpd="sng" algn="ctr">
+                      <a:solidFill>
+                        <a:srgbClr val="DDDDDD"/>
+                      </a:solidFill>
+                      <a:prstDash val="solid"/>
+                      <a:round/>
+                      <a:headEnd type="none" w="med" len="med"/>
+                      <a:tailEnd type="none" w="med" len="med"/>
+                    </a:lnT>
+                    <a:lnB w="5443" cap="flat" cmpd="sng" algn="ctr">
+                      <a:solidFill>
+                        <a:srgbClr val="DDDDDD"/>
+                      </a:solidFill>
+                      <a:prstDash val="solid"/>
+                      <a:round/>
+                      <a:headEnd type="none" w="med" len="med"/>
+                      <a:tailEnd type="none" w="med" len="med"/>
+                    </a:lnB>
+                    <a:solidFill>
+                      <a:srgbClr val="FFFFFF"/>
+                    </a:solidFill>
+                  </a:tcPr>
+                </a:tc>
+                <a:extLst>
+                  <a:ext uri="{0D108BD9-81ED-4DB2-BD59-A6C34878D82A}">
+                    <a16:rowId xmlns:a16="http://schemas.microsoft.com/office/drawing/2014/main" val="1048854025"/>
+                  </a:ext>
+                </a:extLst>
+              </a:tr>
+              <a:tr h="307293">
+                <a:tc>
+                  <a:txBody>
+                    <a:bodyPr/>
+                    <a:lstStyle/>
+                    <a:p>
+                      <a:r>
+                        <a:rPr lang="en-US" sz="2000">
+                          <a:effectLst/>
+                        </a:rPr>
+                        <a:t>Button</a:t>
+                      </a:r>
+                    </a:p>
+                  </a:txBody>
+                  <a:tcPr marL="24568" marR="24568" marT="11339" marB="11339" anchor="ctr">
+                    <a:lnL w="5443" cap="flat" cmpd="sng" algn="ctr">
+                      <a:solidFill>
+                        <a:srgbClr val="DDDDDD"/>
+                      </a:solidFill>
+                      <a:prstDash val="solid"/>
+                      <a:round/>
+                      <a:headEnd type="none" w="med" len="med"/>
+                      <a:tailEnd type="none" w="med" len="med"/>
+                    </a:lnL>
+                    <a:lnR w="5443" cap="flat" cmpd="sng" algn="ctr">
+                      <a:solidFill>
+                        <a:srgbClr val="DDDDDD"/>
+                      </a:solidFill>
+                      <a:prstDash val="solid"/>
+                      <a:round/>
+                      <a:headEnd type="none" w="med" len="med"/>
+                      <a:tailEnd type="none" w="med" len="med"/>
+                    </a:lnR>
+                    <a:lnT w="5443" cap="flat" cmpd="sng" algn="ctr">
+                      <a:solidFill>
+                        <a:srgbClr val="DDDDDD"/>
+                      </a:solidFill>
+                      <a:prstDash val="solid"/>
+                      <a:round/>
+                      <a:headEnd type="none" w="med" len="med"/>
+                      <a:tailEnd type="none" w="med" len="med"/>
+                    </a:lnT>
+                    <a:lnB w="5443" cap="flat" cmpd="sng" algn="ctr">
+                      <a:solidFill>
+                        <a:srgbClr val="DDDDDD"/>
+                      </a:solidFill>
+                      <a:prstDash val="solid"/>
+                      <a:round/>
+                      <a:headEnd type="none" w="med" len="med"/>
+                      <a:tailEnd type="none" w="med" len="med"/>
+                    </a:lnB>
+                    <a:solidFill>
+                      <a:srgbClr val="FFFFFF"/>
+                    </a:solidFill>
+                  </a:tcPr>
+                </a:tc>
+                <a:tc>
+                  <a:txBody>
+                    <a:bodyPr/>
+                    <a:lstStyle/>
+                    <a:p>
+                      <a:pPr algn="ctr"/>
+                      <a:r>
+                        <a:rPr lang="en-US" sz="2000" dirty="0">
+                          <a:effectLst/>
+                        </a:rPr>
+                        <a:t>15</a:t>
+                      </a:r>
+                    </a:p>
+                  </a:txBody>
+                  <a:tcPr marL="24568" marR="24568" marT="11339" marB="11339" anchor="ctr">
+                    <a:lnL w="5443" cap="flat" cmpd="sng" algn="ctr">
+                      <a:solidFill>
+                        <a:srgbClr val="DDDDDD"/>
+                      </a:solidFill>
+                      <a:prstDash val="solid"/>
+                      <a:round/>
+                      <a:headEnd type="none" w="med" len="med"/>
+                      <a:tailEnd type="none" w="med" len="med"/>
+                    </a:lnL>
+                    <a:lnR w="5443" cap="flat" cmpd="sng" algn="ctr">
+                      <a:solidFill>
+                        <a:srgbClr val="DDDDDD"/>
+                      </a:solidFill>
+                      <a:prstDash val="solid"/>
+                      <a:round/>
+                      <a:headEnd type="none" w="med" len="med"/>
+                      <a:tailEnd type="none" w="med" len="med"/>
+                    </a:lnR>
+                    <a:lnT w="5443" cap="flat" cmpd="sng" algn="ctr">
+                      <a:solidFill>
+                        <a:srgbClr val="DDDDDD"/>
+                      </a:solidFill>
+                      <a:prstDash val="solid"/>
+                      <a:round/>
+                      <a:headEnd type="none" w="med" len="med"/>
+                      <a:tailEnd type="none" w="med" len="med"/>
+                    </a:lnT>
+                    <a:lnB w="5443" cap="flat" cmpd="sng" algn="ctr">
+                      <a:solidFill>
+                        <a:srgbClr val="DDDDDD"/>
+                      </a:solidFill>
+                      <a:prstDash val="solid"/>
+                      <a:round/>
+                      <a:headEnd type="none" w="med" len="med"/>
+                      <a:tailEnd type="none" w="med" len="med"/>
+                    </a:lnB>
+                    <a:solidFill>
+                      <a:srgbClr val="FFFFFF"/>
+                    </a:solidFill>
+                  </a:tcPr>
+                </a:tc>
+                <a:extLst>
+                  <a:ext uri="{0D108BD9-81ED-4DB2-BD59-A6C34878D82A}">
+                    <a16:rowId xmlns:a16="http://schemas.microsoft.com/office/drawing/2014/main" val="663980406"/>
+                  </a:ext>
+                </a:extLst>
+              </a:tr>
+              <a:tr h="307293">
+                <a:tc>
+                  <a:txBody>
+                    <a:bodyPr/>
+                    <a:lstStyle/>
+                    <a:p>
+                      <a:r>
+                        <a:rPr lang="en-US" sz="2000" dirty="0">
+                          <a:effectLst/>
+                        </a:rPr>
+                        <a:t>Button</a:t>
+                      </a:r>
+                    </a:p>
+                  </a:txBody>
+                  <a:tcPr marL="24568" marR="24568" marT="11339" marB="11339" anchor="ctr">
+                    <a:lnL w="5443" cap="flat" cmpd="sng" algn="ctr">
+                      <a:solidFill>
+                        <a:srgbClr val="DDDDDD"/>
+                      </a:solidFill>
+                      <a:prstDash val="solid"/>
+                      <a:round/>
+                      <a:headEnd type="none" w="med" len="med"/>
+                      <a:tailEnd type="none" w="med" len="med"/>
+                    </a:lnL>
+                    <a:lnR w="5443" cap="flat" cmpd="sng" algn="ctr">
+                      <a:solidFill>
+                        <a:srgbClr val="DDDDDD"/>
+                      </a:solidFill>
+                      <a:prstDash val="solid"/>
+                      <a:round/>
+                      <a:headEnd type="none" w="med" len="med"/>
+                      <a:tailEnd type="none" w="med" len="med"/>
+                    </a:lnR>
+                    <a:lnT w="5443" cap="flat" cmpd="sng" algn="ctr">
+                      <a:solidFill>
+                        <a:srgbClr val="DDDDDD"/>
+                      </a:solidFill>
+                      <a:prstDash val="solid"/>
+                      <a:round/>
+                      <a:headEnd type="none" w="med" len="med"/>
+                      <a:tailEnd type="none" w="med" len="med"/>
+                    </a:lnT>
+                    <a:lnB w="5443" cap="flat" cmpd="sng" algn="ctr">
+                      <a:solidFill>
+                        <a:srgbClr val="DDDDDD"/>
+                      </a:solidFill>
+                      <a:prstDash val="solid"/>
+                      <a:round/>
+                      <a:headEnd type="none" w="med" len="med"/>
+                      <a:tailEnd type="none" w="med" len="med"/>
+                    </a:lnB>
+                    <a:solidFill>
+                      <a:srgbClr val="FFFFFF"/>
+                    </a:solidFill>
+                  </a:tcPr>
+                </a:tc>
+                <a:tc>
+                  <a:txBody>
+                    <a:bodyPr/>
+                    <a:lstStyle/>
+                    <a:p>
+                      <a:pPr algn="ctr"/>
+                      <a:r>
+                        <a:rPr lang="en-US" sz="2000" dirty="0">
+                          <a:effectLst/>
+                        </a:rPr>
+                        <a:t>14</a:t>
+                      </a:r>
+                    </a:p>
+                  </a:txBody>
+                  <a:tcPr marL="24568" marR="24568" marT="11339" marB="11339" anchor="ctr">
+                    <a:lnL w="5443" cap="flat" cmpd="sng" algn="ctr">
+                      <a:solidFill>
+                        <a:srgbClr val="DDDDDD"/>
+                      </a:solidFill>
+                      <a:prstDash val="solid"/>
+                      <a:round/>
+                      <a:headEnd type="none" w="med" len="med"/>
+                      <a:tailEnd type="none" w="med" len="med"/>
+                    </a:lnL>
+                    <a:lnR w="5443" cap="flat" cmpd="sng" algn="ctr">
+                      <a:solidFill>
+                        <a:srgbClr val="DDDDDD"/>
+                      </a:solidFill>
+                      <a:prstDash val="solid"/>
+                      <a:round/>
+                      <a:headEnd type="none" w="med" len="med"/>
+                      <a:tailEnd type="none" w="med" len="med"/>
+                    </a:lnR>
+                    <a:lnT w="5443" cap="flat" cmpd="sng" algn="ctr">
+                      <a:solidFill>
+                        <a:srgbClr val="DDDDDD"/>
+                      </a:solidFill>
+                      <a:prstDash val="solid"/>
+                      <a:round/>
+                      <a:headEnd type="none" w="med" len="med"/>
+                      <a:tailEnd type="none" w="med" len="med"/>
+                    </a:lnT>
+                    <a:lnB w="5443" cap="flat" cmpd="sng" algn="ctr">
+                      <a:solidFill>
+                        <a:srgbClr val="DDDDDD"/>
+                      </a:solidFill>
+                      <a:prstDash val="solid"/>
+                      <a:round/>
+                      <a:headEnd type="none" w="med" len="med"/>
+                      <a:tailEnd type="none" w="med" len="med"/>
+                    </a:lnB>
+                    <a:solidFill>
+                      <a:srgbClr val="FFFFFF"/>
+                    </a:solidFill>
+                  </a:tcPr>
+                </a:tc>
+                <a:extLst>
+                  <a:ext uri="{0D108BD9-81ED-4DB2-BD59-A6C34878D82A}">
+                    <a16:rowId xmlns:a16="http://schemas.microsoft.com/office/drawing/2014/main" val="751520324"/>
+                  </a:ext>
+                </a:extLst>
+              </a:tr>
+              <a:tr h="307293">
+                <a:tc>
+                  <a:txBody>
+                    <a:bodyPr/>
+                    <a:lstStyle/>
+                    <a:p>
+                      <a:r>
+                        <a:rPr lang="en-US" sz="2000" dirty="0">
+                          <a:effectLst/>
+                        </a:rPr>
+                        <a:t>LED</a:t>
+                      </a:r>
+                    </a:p>
+                  </a:txBody>
+                  <a:tcPr marL="24568" marR="24568" marT="11339" marB="11339" anchor="ctr">
+                    <a:lnL w="5443" cap="flat" cmpd="sng" algn="ctr">
+                      <a:solidFill>
+                        <a:srgbClr val="DDDDDD"/>
+                      </a:solidFill>
+                      <a:prstDash val="solid"/>
+                      <a:round/>
+                      <a:headEnd type="none" w="med" len="med"/>
+                      <a:tailEnd type="none" w="med" len="med"/>
+                    </a:lnL>
+                    <a:lnR w="5443" cap="flat" cmpd="sng" algn="ctr">
+                      <a:solidFill>
+                        <a:srgbClr val="DDDDDD"/>
+                      </a:solidFill>
+                      <a:prstDash val="solid"/>
+                      <a:round/>
+                      <a:headEnd type="none" w="med" len="med"/>
+                      <a:tailEnd type="none" w="med" len="med"/>
+                    </a:lnR>
+                    <a:lnT w="5443" cap="flat" cmpd="sng" algn="ctr">
+                      <a:solidFill>
+                        <a:srgbClr val="DDDDDD"/>
+                      </a:solidFill>
+                      <a:prstDash val="solid"/>
+                      <a:round/>
+                      <a:headEnd type="none" w="med" len="med"/>
+                      <a:tailEnd type="none" w="med" len="med"/>
+                    </a:lnT>
+                    <a:lnB w="5443" cap="flat" cmpd="sng" algn="ctr">
+                      <a:solidFill>
+                        <a:srgbClr val="DDDDDD"/>
+                      </a:solidFill>
+                      <a:prstDash val="solid"/>
+                      <a:round/>
+                      <a:headEnd type="none" w="med" len="med"/>
+                      <a:tailEnd type="none" w="med" len="med"/>
+                    </a:lnB>
+                    <a:solidFill>
+                      <a:srgbClr val="FFFFFF"/>
+                    </a:solidFill>
+                  </a:tcPr>
+                </a:tc>
+                <a:tc>
+                  <a:txBody>
+                    <a:bodyPr/>
+                    <a:lstStyle/>
+                    <a:p>
+                      <a:pPr algn="ctr"/>
+                      <a:r>
+                        <a:rPr lang="en-US" sz="2000" dirty="0">
+                          <a:effectLst/>
+                        </a:rPr>
+                        <a:t>14</a:t>
+                      </a:r>
+                    </a:p>
+                  </a:txBody>
+                  <a:tcPr marL="24568" marR="24568" marT="11339" marB="11339" anchor="ctr">
+                    <a:lnL w="5443" cap="flat" cmpd="sng" algn="ctr">
+                      <a:solidFill>
+                        <a:srgbClr val="DDDDDD"/>
+                      </a:solidFill>
+                      <a:prstDash val="solid"/>
+                      <a:round/>
+                      <a:headEnd type="none" w="med" len="med"/>
+                      <a:tailEnd type="none" w="med" len="med"/>
+                    </a:lnL>
+                    <a:lnR w="5443" cap="flat" cmpd="sng" algn="ctr">
+                      <a:solidFill>
+                        <a:srgbClr val="DDDDDD"/>
+                      </a:solidFill>
+                      <a:prstDash val="solid"/>
+                      <a:round/>
+                      <a:headEnd type="none" w="med" len="med"/>
+                      <a:tailEnd type="none" w="med" len="med"/>
+                    </a:lnR>
+                    <a:lnT w="5443" cap="flat" cmpd="sng" algn="ctr">
+                      <a:solidFill>
+                        <a:srgbClr val="DDDDDD"/>
+                      </a:solidFill>
+                      <a:prstDash val="solid"/>
+                      <a:round/>
+                      <a:headEnd type="none" w="med" len="med"/>
+                      <a:tailEnd type="none" w="med" len="med"/>
+                    </a:lnT>
+                    <a:lnB w="5443" cap="flat" cmpd="sng" algn="ctr">
+                      <a:solidFill>
+                        <a:srgbClr val="DDDDDD"/>
+                      </a:solidFill>
+                      <a:prstDash val="solid"/>
+                      <a:round/>
+                      <a:headEnd type="none" w="med" len="med"/>
+                      <a:tailEnd type="none" w="med" len="med"/>
+                    </a:lnB>
+                    <a:solidFill>
+                      <a:srgbClr val="FFFFFF"/>
+                    </a:solidFill>
+                  </a:tcPr>
+                </a:tc>
+                <a:extLst>
+                  <a:ext uri="{0D108BD9-81ED-4DB2-BD59-A6C34878D82A}">
+                    <a16:rowId xmlns:a16="http://schemas.microsoft.com/office/drawing/2014/main" val="3712619895"/>
+                  </a:ext>
+                </a:extLst>
+              </a:tr>
+            </a:tbl>
+          </a:graphicData>
+        </a:graphic>
+      </p:graphicFrame>
     </p:spTree>
     <p:extLst>
       <p:ext uri="{BB962C8B-B14F-4D97-AF65-F5344CB8AC3E}">
-        <p14:creationId xmlns:p14="http://schemas.microsoft.com/office/powerpoint/2010/main" val="1251222904"/>
+        <p14:creationId xmlns:p14="http://schemas.microsoft.com/office/powerpoint/2010/main" val="4113172726"/>
       </p:ext>
     </p:extLst>
   </p:cSld>
@@ -10020,6 +10560,953 @@
     <p:extLst>
       <p:ext uri="{BB962C8B-B14F-4D97-AF65-F5344CB8AC3E}">
         <p14:creationId xmlns:p14="http://schemas.microsoft.com/office/powerpoint/2010/main" val="2392235267"/>
+      </p:ext>
+    </p:extLst>
+  </p:cSld>
+  <p:clrMapOvr>
+    <a:masterClrMapping/>
+  </p:clrMapOvr>
+</p:sld>
+</file>
+
+<file path=ppt/slides/slide52.xml><?xml version="1.0" encoding="utf-8"?>
+<p:sld xmlns:a="http://schemas.openxmlformats.org/drawingml/2006/main" xmlns:r="http://schemas.openxmlformats.org/officeDocument/2006/relationships" xmlns:p="http://schemas.openxmlformats.org/presentationml/2006/main">
+  <p:cSld>
+    <p:spTree>
+      <p:nvGrpSpPr>
+        <p:cNvPr id="1" name=""/>
+        <p:cNvGrpSpPr/>
+        <p:nvPr/>
+      </p:nvGrpSpPr>
+      <p:grpSpPr>
+        <a:xfrm>
+          <a:off x="0" y="0"/>
+          <a:ext cx="0" cy="0"/>
+          <a:chOff x="0" y="0"/>
+          <a:chExt cx="0" cy="0"/>
+        </a:xfrm>
+      </p:grpSpPr>
+      <p:pic>
+        <p:nvPicPr>
+          <p:cNvPr id="1028" name="Picture 2" descr="GPIO diagram"/>
+          <p:cNvPicPr>
+            <a:picLocks noChangeAspect="1"/>
+          </p:cNvPicPr>
+          <p:nvPr/>
+        </p:nvPicPr>
+        <p:blipFill rotWithShape="1">
+          <a:blip r:embed="rId2">
+            <a:extLst>
+              <a:ext uri="{28A0092B-C50C-407E-A947-70E740481C1C}">
+                <a14:useLocalDpi xmlns:a14="http://schemas.microsoft.com/office/drawing/2010/main" val="0"/>
+              </a:ext>
+            </a:extLst>
+          </a:blip>
+          <a:srcRect t="2450" r="-2" b="4182"/>
+          <a:stretch/>
+        </p:blipFill>
+        <p:spPr>
+          <a:xfrm>
+            <a:off x="4639056" y="10"/>
+            <a:ext cx="7552944" cy="6857990"/>
+          </a:xfrm>
+          <a:prstGeom prst="rect">
+            <a:avLst/>
+          </a:prstGeom>
+          <a:effectLst/>
+        </p:spPr>
+      </p:pic>
+      <p:sp>
+        <p:nvSpPr>
+          <p:cNvPr id="2" name="Title 1"/>
+          <p:cNvSpPr>
+            <a:spLocks noGrp="1"/>
+          </p:cNvSpPr>
+          <p:nvPr>
+            <p:ph type="title"/>
+          </p:nvPr>
+        </p:nvSpPr>
+        <p:spPr>
+          <a:xfrm>
+            <a:off x="648929" y="629266"/>
+            <a:ext cx="3651467" cy="1676603"/>
+          </a:xfrm>
+        </p:spPr>
+        <p:txBody>
+          <a:bodyPr>
+            <a:normAutofit/>
+          </a:bodyPr>
+          <a:lstStyle/>
+          <a:p>
+            <a:r>
+              <a:rPr lang="en-US" dirty="0"/>
+              <a:t>Traffic Lights</a:t>
+            </a:r>
+            <a:br>
+              <a:rPr lang="en-US" dirty="0"/>
+            </a:br>
+            <a:r>
+              <a:rPr lang="en-US" dirty="0"/>
+              <a:t>Exercise</a:t>
+            </a:r>
+          </a:p>
+        </p:txBody>
+      </p:sp>
+      <p:graphicFrame>
+        <p:nvGraphicFramePr>
+          <p:cNvPr id="4" name="Content Placeholder 3"/>
+          <p:cNvGraphicFramePr>
+            <a:graphicFrameLocks noGrp="1"/>
+          </p:cNvGraphicFramePr>
+          <p:nvPr>
+            <p:ph idx="1"/>
+            <p:extLst>
+              <p:ext uri="{D42A27DB-BD31-4B8C-83A1-F6EECF244321}">
+                <p14:modId xmlns:p14="http://schemas.microsoft.com/office/powerpoint/2010/main" val="1121207410"/>
+              </p:ext>
+            </p:extLst>
+          </p:nvPr>
+        </p:nvGraphicFramePr>
+        <p:xfrm>
+          <a:off x="649288" y="2841520"/>
+          <a:ext cx="3023060" cy="1964868"/>
+        </p:xfrm>
+        <a:graphic>
+          <a:graphicData uri="http://schemas.openxmlformats.org/drawingml/2006/table">
+            <a:tbl>
+              <a:tblPr/>
+              <a:tblGrid>
+                <a:gridCol w="1511530">
+                  <a:extLst>
+                    <a:ext uri="{9D8B030D-6E8A-4147-A177-3AD203B41FA5}">
+                      <a16:colId xmlns:a16="http://schemas.microsoft.com/office/drawing/2014/main" val="3764869724"/>
+                    </a:ext>
+                  </a:extLst>
+                </a:gridCol>
+                <a:gridCol w="1511530">
+                  <a:extLst>
+                    <a:ext uri="{9D8B030D-6E8A-4147-A177-3AD203B41FA5}">
+                      <a16:colId xmlns:a16="http://schemas.microsoft.com/office/drawing/2014/main" val="2130788667"/>
+                    </a:ext>
+                  </a:extLst>
+                </a:gridCol>
+              </a:tblGrid>
+              <a:tr h="307293">
+                <a:tc>
+                  <a:txBody>
+                    <a:bodyPr/>
+                    <a:lstStyle/>
+                    <a:p>
+                      <a:r>
+                        <a:rPr lang="en-US" sz="2000" b="1">
+                          <a:effectLst/>
+                        </a:rPr>
+                        <a:t>Component</a:t>
+                      </a:r>
+                    </a:p>
+                  </a:txBody>
+                  <a:tcPr marL="24568" marR="24568" marT="11339" marB="11339" anchor="ctr">
+                    <a:lnL w="5443" cap="flat" cmpd="sng" algn="ctr">
+                      <a:solidFill>
+                        <a:srgbClr val="DDDDDD"/>
+                      </a:solidFill>
+                      <a:prstDash val="solid"/>
+                      <a:round/>
+                      <a:headEnd type="none" w="med" len="med"/>
+                      <a:tailEnd type="none" w="med" len="med"/>
+                    </a:lnL>
+                    <a:lnR w="5443" cap="flat" cmpd="sng" algn="ctr">
+                      <a:solidFill>
+                        <a:srgbClr val="DDDDDD"/>
+                      </a:solidFill>
+                      <a:prstDash val="solid"/>
+                      <a:round/>
+                      <a:headEnd type="none" w="med" len="med"/>
+                      <a:tailEnd type="none" w="med" len="med"/>
+                    </a:lnR>
+                    <a:lnT w="5443" cap="flat" cmpd="sng" algn="ctr">
+                      <a:solidFill>
+                        <a:srgbClr val="DDDDDD"/>
+                      </a:solidFill>
+                      <a:prstDash val="solid"/>
+                      <a:round/>
+                      <a:headEnd type="none" w="med" len="med"/>
+                      <a:tailEnd type="none" w="med" len="med"/>
+                    </a:lnT>
+                    <a:lnB w="5443" cap="flat" cmpd="sng" algn="ctr">
+                      <a:solidFill>
+                        <a:srgbClr val="DDDDDD"/>
+                      </a:solidFill>
+                      <a:prstDash val="solid"/>
+                      <a:round/>
+                      <a:headEnd type="none" w="med" len="med"/>
+                      <a:tailEnd type="none" w="med" len="med"/>
+                    </a:lnB>
+                    <a:solidFill>
+                      <a:srgbClr val="FFFFFF"/>
+                    </a:solidFill>
+                  </a:tcPr>
+                </a:tc>
+                <a:tc>
+                  <a:txBody>
+                    <a:bodyPr/>
+                    <a:lstStyle/>
+                    <a:p>
+                      <a:pPr algn="ctr"/>
+                      <a:r>
+                        <a:rPr lang="en-US" sz="2000" b="1" dirty="0">
+                          <a:effectLst/>
+                        </a:rPr>
+                        <a:t>GPIO pin</a:t>
+                      </a:r>
+                    </a:p>
+                  </a:txBody>
+                  <a:tcPr marL="24568" marR="24568" marT="11339" marB="11339" anchor="ctr">
+                    <a:lnL w="5443" cap="flat" cmpd="sng" algn="ctr">
+                      <a:solidFill>
+                        <a:srgbClr val="DDDDDD"/>
+                      </a:solidFill>
+                      <a:prstDash val="solid"/>
+                      <a:round/>
+                      <a:headEnd type="none" w="med" len="med"/>
+                      <a:tailEnd type="none" w="med" len="med"/>
+                    </a:lnL>
+                    <a:lnR w="5443" cap="flat" cmpd="sng" algn="ctr">
+                      <a:solidFill>
+                        <a:srgbClr val="DDDDDD"/>
+                      </a:solidFill>
+                      <a:prstDash val="solid"/>
+                      <a:round/>
+                      <a:headEnd type="none" w="med" len="med"/>
+                      <a:tailEnd type="none" w="med" len="med"/>
+                    </a:lnR>
+                    <a:lnT w="5443" cap="flat" cmpd="sng" algn="ctr">
+                      <a:solidFill>
+                        <a:srgbClr val="DDDDDD"/>
+                      </a:solidFill>
+                      <a:prstDash val="solid"/>
+                      <a:round/>
+                      <a:headEnd type="none" w="med" len="med"/>
+                      <a:tailEnd type="none" w="med" len="med"/>
+                    </a:lnT>
+                    <a:lnB w="5443" cap="flat" cmpd="sng" algn="ctr">
+                      <a:solidFill>
+                        <a:srgbClr val="DDDDDD"/>
+                      </a:solidFill>
+                      <a:prstDash val="solid"/>
+                      <a:round/>
+                      <a:headEnd type="none" w="med" len="med"/>
+                      <a:tailEnd type="none" w="med" len="med"/>
+                    </a:lnB>
+                    <a:solidFill>
+                      <a:srgbClr val="FFFFFF"/>
+                    </a:solidFill>
+                  </a:tcPr>
+                </a:tc>
+                <a:extLst>
+                  <a:ext uri="{0D108BD9-81ED-4DB2-BD59-A6C34878D82A}">
+                    <a16:rowId xmlns:a16="http://schemas.microsoft.com/office/drawing/2014/main" val="1048854025"/>
+                  </a:ext>
+                </a:extLst>
+              </a:tr>
+              <a:tr h="307293">
+                <a:tc>
+                  <a:txBody>
+                    <a:bodyPr/>
+                    <a:lstStyle/>
+                    <a:p>
+                      <a:r>
+                        <a:rPr lang="en-US" sz="2000">
+                          <a:effectLst/>
+                        </a:rPr>
+                        <a:t>Button</a:t>
+                      </a:r>
+                    </a:p>
+                  </a:txBody>
+                  <a:tcPr marL="24568" marR="24568" marT="11339" marB="11339" anchor="ctr">
+                    <a:lnL w="5443" cap="flat" cmpd="sng" algn="ctr">
+                      <a:solidFill>
+                        <a:srgbClr val="DDDDDD"/>
+                      </a:solidFill>
+                      <a:prstDash val="solid"/>
+                      <a:round/>
+                      <a:headEnd type="none" w="med" len="med"/>
+                      <a:tailEnd type="none" w="med" len="med"/>
+                    </a:lnL>
+                    <a:lnR w="5443" cap="flat" cmpd="sng" algn="ctr">
+                      <a:solidFill>
+                        <a:srgbClr val="DDDDDD"/>
+                      </a:solidFill>
+                      <a:prstDash val="solid"/>
+                      <a:round/>
+                      <a:headEnd type="none" w="med" len="med"/>
+                      <a:tailEnd type="none" w="med" len="med"/>
+                    </a:lnR>
+                    <a:lnT w="5443" cap="flat" cmpd="sng" algn="ctr">
+                      <a:solidFill>
+                        <a:srgbClr val="DDDDDD"/>
+                      </a:solidFill>
+                      <a:prstDash val="solid"/>
+                      <a:round/>
+                      <a:headEnd type="none" w="med" len="med"/>
+                      <a:tailEnd type="none" w="med" len="med"/>
+                    </a:lnT>
+                    <a:lnB w="5443" cap="flat" cmpd="sng" algn="ctr">
+                      <a:solidFill>
+                        <a:srgbClr val="DDDDDD"/>
+                      </a:solidFill>
+                      <a:prstDash val="solid"/>
+                      <a:round/>
+                      <a:headEnd type="none" w="med" len="med"/>
+                      <a:tailEnd type="none" w="med" len="med"/>
+                    </a:lnB>
+                    <a:solidFill>
+                      <a:srgbClr val="FFFFFF"/>
+                    </a:solidFill>
+                  </a:tcPr>
+                </a:tc>
+                <a:tc>
+                  <a:txBody>
+                    <a:bodyPr/>
+                    <a:lstStyle/>
+                    <a:p>
+                      <a:pPr algn="ctr"/>
+                      <a:r>
+                        <a:rPr lang="en-US" sz="2000" dirty="0">
+                          <a:effectLst/>
+                        </a:rPr>
+                        <a:t>21</a:t>
+                      </a:r>
+                    </a:p>
+                  </a:txBody>
+                  <a:tcPr marL="24568" marR="24568" marT="11339" marB="11339" anchor="ctr">
+                    <a:lnL w="5443" cap="flat" cmpd="sng" algn="ctr">
+                      <a:solidFill>
+                        <a:srgbClr val="DDDDDD"/>
+                      </a:solidFill>
+                      <a:prstDash val="solid"/>
+                      <a:round/>
+                      <a:headEnd type="none" w="med" len="med"/>
+                      <a:tailEnd type="none" w="med" len="med"/>
+                    </a:lnL>
+                    <a:lnR w="5443" cap="flat" cmpd="sng" algn="ctr">
+                      <a:solidFill>
+                        <a:srgbClr val="DDDDDD"/>
+                      </a:solidFill>
+                      <a:prstDash val="solid"/>
+                      <a:round/>
+                      <a:headEnd type="none" w="med" len="med"/>
+                      <a:tailEnd type="none" w="med" len="med"/>
+                    </a:lnR>
+                    <a:lnT w="5443" cap="flat" cmpd="sng" algn="ctr">
+                      <a:solidFill>
+                        <a:srgbClr val="DDDDDD"/>
+                      </a:solidFill>
+                      <a:prstDash val="solid"/>
+                      <a:round/>
+                      <a:headEnd type="none" w="med" len="med"/>
+                      <a:tailEnd type="none" w="med" len="med"/>
+                    </a:lnT>
+                    <a:lnB w="5443" cap="flat" cmpd="sng" algn="ctr">
+                      <a:solidFill>
+                        <a:srgbClr val="DDDDDD"/>
+                      </a:solidFill>
+                      <a:prstDash val="solid"/>
+                      <a:round/>
+                      <a:headEnd type="none" w="med" len="med"/>
+                      <a:tailEnd type="none" w="med" len="med"/>
+                    </a:lnB>
+                    <a:solidFill>
+                      <a:srgbClr val="FFFFFF"/>
+                    </a:solidFill>
+                  </a:tcPr>
+                </a:tc>
+                <a:extLst>
+                  <a:ext uri="{0D108BD9-81ED-4DB2-BD59-A6C34878D82A}">
+                    <a16:rowId xmlns:a16="http://schemas.microsoft.com/office/drawing/2014/main" val="663980406"/>
+                  </a:ext>
+                </a:extLst>
+              </a:tr>
+              <a:tr h="307293">
+                <a:tc>
+                  <a:txBody>
+                    <a:bodyPr/>
+                    <a:lstStyle/>
+                    <a:p>
+                      <a:r>
+                        <a:rPr lang="en-US" sz="2000">
+                          <a:effectLst/>
+                        </a:rPr>
+                        <a:t>Red LED</a:t>
+                      </a:r>
+                    </a:p>
+                  </a:txBody>
+                  <a:tcPr marL="24568" marR="24568" marT="11339" marB="11339" anchor="ctr">
+                    <a:lnL w="5443" cap="flat" cmpd="sng" algn="ctr">
+                      <a:solidFill>
+                        <a:srgbClr val="DDDDDD"/>
+                      </a:solidFill>
+                      <a:prstDash val="solid"/>
+                      <a:round/>
+                      <a:headEnd type="none" w="med" len="med"/>
+                      <a:tailEnd type="none" w="med" len="med"/>
+                    </a:lnL>
+                    <a:lnR w="5443" cap="flat" cmpd="sng" algn="ctr">
+                      <a:solidFill>
+                        <a:srgbClr val="DDDDDD"/>
+                      </a:solidFill>
+                      <a:prstDash val="solid"/>
+                      <a:round/>
+                      <a:headEnd type="none" w="med" len="med"/>
+                      <a:tailEnd type="none" w="med" len="med"/>
+                    </a:lnR>
+                    <a:lnT w="5443" cap="flat" cmpd="sng" algn="ctr">
+                      <a:solidFill>
+                        <a:srgbClr val="DDDDDD"/>
+                      </a:solidFill>
+                      <a:prstDash val="solid"/>
+                      <a:round/>
+                      <a:headEnd type="none" w="med" len="med"/>
+                      <a:tailEnd type="none" w="med" len="med"/>
+                    </a:lnT>
+                    <a:lnB w="5443" cap="flat" cmpd="sng" algn="ctr">
+                      <a:solidFill>
+                        <a:srgbClr val="DDDDDD"/>
+                      </a:solidFill>
+                      <a:prstDash val="solid"/>
+                      <a:round/>
+                      <a:headEnd type="none" w="med" len="med"/>
+                      <a:tailEnd type="none" w="med" len="med"/>
+                    </a:lnB>
+                    <a:solidFill>
+                      <a:srgbClr val="FFFFFF"/>
+                    </a:solidFill>
+                  </a:tcPr>
+                </a:tc>
+                <a:tc>
+                  <a:txBody>
+                    <a:bodyPr/>
+                    <a:lstStyle/>
+                    <a:p>
+                      <a:pPr algn="ctr"/>
+                      <a:r>
+                        <a:rPr lang="en-US" sz="2000">
+                          <a:effectLst/>
+                        </a:rPr>
+                        <a:t>25</a:t>
+                      </a:r>
+                    </a:p>
+                  </a:txBody>
+                  <a:tcPr marL="24568" marR="24568" marT="11339" marB="11339" anchor="ctr">
+                    <a:lnL w="5443" cap="flat" cmpd="sng" algn="ctr">
+                      <a:solidFill>
+                        <a:srgbClr val="DDDDDD"/>
+                      </a:solidFill>
+                      <a:prstDash val="solid"/>
+                      <a:round/>
+                      <a:headEnd type="none" w="med" len="med"/>
+                      <a:tailEnd type="none" w="med" len="med"/>
+                    </a:lnL>
+                    <a:lnR w="5443" cap="flat" cmpd="sng" algn="ctr">
+                      <a:solidFill>
+                        <a:srgbClr val="DDDDDD"/>
+                      </a:solidFill>
+                      <a:prstDash val="solid"/>
+                      <a:round/>
+                      <a:headEnd type="none" w="med" len="med"/>
+                      <a:tailEnd type="none" w="med" len="med"/>
+                    </a:lnR>
+                    <a:lnT w="5443" cap="flat" cmpd="sng" algn="ctr">
+                      <a:solidFill>
+                        <a:srgbClr val="DDDDDD"/>
+                      </a:solidFill>
+                      <a:prstDash val="solid"/>
+                      <a:round/>
+                      <a:headEnd type="none" w="med" len="med"/>
+                      <a:tailEnd type="none" w="med" len="med"/>
+                    </a:lnT>
+                    <a:lnB w="5443" cap="flat" cmpd="sng" algn="ctr">
+                      <a:solidFill>
+                        <a:srgbClr val="DDDDDD"/>
+                      </a:solidFill>
+                      <a:prstDash val="solid"/>
+                      <a:round/>
+                      <a:headEnd type="none" w="med" len="med"/>
+                      <a:tailEnd type="none" w="med" len="med"/>
+                    </a:lnB>
+                    <a:solidFill>
+                      <a:srgbClr val="FFFFFF"/>
+                    </a:solidFill>
+                  </a:tcPr>
+                </a:tc>
+                <a:extLst>
+                  <a:ext uri="{0D108BD9-81ED-4DB2-BD59-A6C34878D82A}">
+                    <a16:rowId xmlns:a16="http://schemas.microsoft.com/office/drawing/2014/main" val="751520324"/>
+                  </a:ext>
+                </a:extLst>
+              </a:tr>
+              <a:tr h="307293">
+                <a:tc>
+                  <a:txBody>
+                    <a:bodyPr/>
+                    <a:lstStyle/>
+                    <a:p>
+                      <a:r>
+                        <a:rPr lang="en-US" sz="2000">
+                          <a:effectLst/>
+                        </a:rPr>
+                        <a:t>Amber LED</a:t>
+                      </a:r>
+                    </a:p>
+                  </a:txBody>
+                  <a:tcPr marL="24568" marR="24568" marT="11339" marB="11339" anchor="ctr">
+                    <a:lnL w="5443" cap="flat" cmpd="sng" algn="ctr">
+                      <a:solidFill>
+                        <a:srgbClr val="DDDDDD"/>
+                      </a:solidFill>
+                      <a:prstDash val="solid"/>
+                      <a:round/>
+                      <a:headEnd type="none" w="med" len="med"/>
+                      <a:tailEnd type="none" w="med" len="med"/>
+                    </a:lnL>
+                    <a:lnR w="5443" cap="flat" cmpd="sng" algn="ctr">
+                      <a:solidFill>
+                        <a:srgbClr val="DDDDDD"/>
+                      </a:solidFill>
+                      <a:prstDash val="solid"/>
+                      <a:round/>
+                      <a:headEnd type="none" w="med" len="med"/>
+                      <a:tailEnd type="none" w="med" len="med"/>
+                    </a:lnR>
+                    <a:lnT w="5443" cap="flat" cmpd="sng" algn="ctr">
+                      <a:solidFill>
+                        <a:srgbClr val="DDDDDD"/>
+                      </a:solidFill>
+                      <a:prstDash val="solid"/>
+                      <a:round/>
+                      <a:headEnd type="none" w="med" len="med"/>
+                      <a:tailEnd type="none" w="med" len="med"/>
+                    </a:lnT>
+                    <a:lnB w="5443" cap="flat" cmpd="sng" algn="ctr">
+                      <a:solidFill>
+                        <a:srgbClr val="DDDDDD"/>
+                      </a:solidFill>
+                      <a:prstDash val="solid"/>
+                      <a:round/>
+                      <a:headEnd type="none" w="med" len="med"/>
+                      <a:tailEnd type="none" w="med" len="med"/>
+                    </a:lnB>
+                    <a:solidFill>
+                      <a:srgbClr val="FFFFFF"/>
+                    </a:solidFill>
+                  </a:tcPr>
+                </a:tc>
+                <a:tc>
+                  <a:txBody>
+                    <a:bodyPr/>
+                    <a:lstStyle/>
+                    <a:p>
+                      <a:pPr algn="ctr"/>
+                      <a:r>
+                        <a:rPr lang="en-US" sz="2000">
+                          <a:effectLst/>
+                        </a:rPr>
+                        <a:t>8</a:t>
+                      </a:r>
+                    </a:p>
+                  </a:txBody>
+                  <a:tcPr marL="24568" marR="24568" marT="11339" marB="11339" anchor="ctr">
+                    <a:lnL w="5443" cap="flat" cmpd="sng" algn="ctr">
+                      <a:solidFill>
+                        <a:srgbClr val="DDDDDD"/>
+                      </a:solidFill>
+                      <a:prstDash val="solid"/>
+                      <a:round/>
+                      <a:headEnd type="none" w="med" len="med"/>
+                      <a:tailEnd type="none" w="med" len="med"/>
+                    </a:lnL>
+                    <a:lnR w="5443" cap="flat" cmpd="sng" algn="ctr">
+                      <a:solidFill>
+                        <a:srgbClr val="DDDDDD"/>
+                      </a:solidFill>
+                      <a:prstDash val="solid"/>
+                      <a:round/>
+                      <a:headEnd type="none" w="med" len="med"/>
+                      <a:tailEnd type="none" w="med" len="med"/>
+                    </a:lnR>
+                    <a:lnT w="5443" cap="flat" cmpd="sng" algn="ctr">
+                      <a:solidFill>
+                        <a:srgbClr val="DDDDDD"/>
+                      </a:solidFill>
+                      <a:prstDash val="solid"/>
+                      <a:round/>
+                      <a:headEnd type="none" w="med" len="med"/>
+                      <a:tailEnd type="none" w="med" len="med"/>
+                    </a:lnT>
+                    <a:lnB w="5443" cap="flat" cmpd="sng" algn="ctr">
+                      <a:solidFill>
+                        <a:srgbClr val="DDDDDD"/>
+                      </a:solidFill>
+                      <a:prstDash val="solid"/>
+                      <a:round/>
+                      <a:headEnd type="none" w="med" len="med"/>
+                      <a:tailEnd type="none" w="med" len="med"/>
+                    </a:lnB>
+                    <a:solidFill>
+                      <a:srgbClr val="FFFFFF"/>
+                    </a:solidFill>
+                  </a:tcPr>
+                </a:tc>
+                <a:extLst>
+                  <a:ext uri="{0D108BD9-81ED-4DB2-BD59-A6C34878D82A}">
+                    <a16:rowId xmlns:a16="http://schemas.microsoft.com/office/drawing/2014/main" val="3712619895"/>
+                  </a:ext>
+                </a:extLst>
+              </a:tr>
+              <a:tr h="307293">
+                <a:tc>
+                  <a:txBody>
+                    <a:bodyPr/>
+                    <a:lstStyle/>
+                    <a:p>
+                      <a:r>
+                        <a:rPr lang="en-US" sz="2000">
+                          <a:effectLst/>
+                        </a:rPr>
+                        <a:t>Green LED</a:t>
+                      </a:r>
+                    </a:p>
+                  </a:txBody>
+                  <a:tcPr marL="24568" marR="24568" marT="11339" marB="11339" anchor="ctr">
+                    <a:lnL w="5443" cap="flat" cmpd="sng" algn="ctr">
+                      <a:solidFill>
+                        <a:srgbClr val="DDDDDD"/>
+                      </a:solidFill>
+                      <a:prstDash val="solid"/>
+                      <a:round/>
+                      <a:headEnd type="none" w="med" len="med"/>
+                      <a:tailEnd type="none" w="med" len="med"/>
+                    </a:lnL>
+                    <a:lnR w="5443" cap="flat" cmpd="sng" algn="ctr">
+                      <a:solidFill>
+                        <a:srgbClr val="DDDDDD"/>
+                      </a:solidFill>
+                      <a:prstDash val="solid"/>
+                      <a:round/>
+                      <a:headEnd type="none" w="med" len="med"/>
+                      <a:tailEnd type="none" w="med" len="med"/>
+                    </a:lnR>
+                    <a:lnT w="5443" cap="flat" cmpd="sng" algn="ctr">
+                      <a:solidFill>
+                        <a:srgbClr val="DDDDDD"/>
+                      </a:solidFill>
+                      <a:prstDash val="solid"/>
+                      <a:round/>
+                      <a:headEnd type="none" w="med" len="med"/>
+                      <a:tailEnd type="none" w="med" len="med"/>
+                    </a:lnT>
+                    <a:lnB w="5443" cap="flat" cmpd="sng" algn="ctr">
+                      <a:solidFill>
+                        <a:srgbClr val="DDDDDD"/>
+                      </a:solidFill>
+                      <a:prstDash val="solid"/>
+                      <a:round/>
+                      <a:headEnd type="none" w="med" len="med"/>
+                      <a:tailEnd type="none" w="med" len="med"/>
+                    </a:lnB>
+                    <a:solidFill>
+                      <a:srgbClr val="FFFFFF"/>
+                    </a:solidFill>
+                  </a:tcPr>
+                </a:tc>
+                <a:tc>
+                  <a:txBody>
+                    <a:bodyPr/>
+                    <a:lstStyle/>
+                    <a:p>
+                      <a:pPr algn="ctr"/>
+                      <a:r>
+                        <a:rPr lang="en-US" sz="2000">
+                          <a:effectLst/>
+                        </a:rPr>
+                        <a:t>7</a:t>
+                      </a:r>
+                    </a:p>
+                  </a:txBody>
+                  <a:tcPr marL="24568" marR="24568" marT="11339" marB="11339" anchor="ctr">
+                    <a:lnL w="5443" cap="flat" cmpd="sng" algn="ctr">
+                      <a:solidFill>
+                        <a:srgbClr val="DDDDDD"/>
+                      </a:solidFill>
+                      <a:prstDash val="solid"/>
+                      <a:round/>
+                      <a:headEnd type="none" w="med" len="med"/>
+                      <a:tailEnd type="none" w="med" len="med"/>
+                    </a:lnL>
+                    <a:lnR w="5443" cap="flat" cmpd="sng" algn="ctr">
+                      <a:solidFill>
+                        <a:srgbClr val="DDDDDD"/>
+                      </a:solidFill>
+                      <a:prstDash val="solid"/>
+                      <a:round/>
+                      <a:headEnd type="none" w="med" len="med"/>
+                      <a:tailEnd type="none" w="med" len="med"/>
+                    </a:lnR>
+                    <a:lnT w="5443" cap="flat" cmpd="sng" algn="ctr">
+                      <a:solidFill>
+                        <a:srgbClr val="DDDDDD"/>
+                      </a:solidFill>
+                      <a:prstDash val="solid"/>
+                      <a:round/>
+                      <a:headEnd type="none" w="med" len="med"/>
+                      <a:tailEnd type="none" w="med" len="med"/>
+                    </a:lnT>
+                    <a:lnB w="5443" cap="flat" cmpd="sng" algn="ctr">
+                      <a:solidFill>
+                        <a:srgbClr val="DDDDDD"/>
+                      </a:solidFill>
+                      <a:prstDash val="solid"/>
+                      <a:round/>
+                      <a:headEnd type="none" w="med" len="med"/>
+                      <a:tailEnd type="none" w="med" len="med"/>
+                    </a:lnB>
+                    <a:solidFill>
+                      <a:srgbClr val="FFFFFF"/>
+                    </a:solidFill>
+                  </a:tcPr>
+                </a:tc>
+                <a:extLst>
+                  <a:ext uri="{0D108BD9-81ED-4DB2-BD59-A6C34878D82A}">
+                    <a16:rowId xmlns:a16="http://schemas.microsoft.com/office/drawing/2014/main" val="2499935102"/>
+                  </a:ext>
+                </a:extLst>
+              </a:tr>
+              <a:tr h="307293">
+                <a:tc>
+                  <a:txBody>
+                    <a:bodyPr/>
+                    <a:lstStyle/>
+                    <a:p>
+                      <a:r>
+                        <a:rPr lang="en-US" sz="2000">
+                          <a:effectLst/>
+                        </a:rPr>
+                        <a:t>Buzzer</a:t>
+                      </a:r>
+                    </a:p>
+                  </a:txBody>
+                  <a:tcPr marL="24568" marR="24568" marT="11339" marB="11339" anchor="ctr">
+                    <a:lnL w="5443" cap="flat" cmpd="sng" algn="ctr">
+                      <a:solidFill>
+                        <a:srgbClr val="DDDDDD"/>
+                      </a:solidFill>
+                      <a:prstDash val="solid"/>
+                      <a:round/>
+                      <a:headEnd type="none" w="med" len="med"/>
+                      <a:tailEnd type="none" w="med" len="med"/>
+                    </a:lnL>
+                    <a:lnR w="5443" cap="flat" cmpd="sng" algn="ctr">
+                      <a:solidFill>
+                        <a:srgbClr val="DDDDDD"/>
+                      </a:solidFill>
+                      <a:prstDash val="solid"/>
+                      <a:round/>
+                      <a:headEnd type="none" w="med" len="med"/>
+                      <a:tailEnd type="none" w="med" len="med"/>
+                    </a:lnR>
+                    <a:lnT w="5443" cap="flat" cmpd="sng" algn="ctr">
+                      <a:solidFill>
+                        <a:srgbClr val="DDDDDD"/>
+                      </a:solidFill>
+                      <a:prstDash val="solid"/>
+                      <a:round/>
+                      <a:headEnd type="none" w="med" len="med"/>
+                      <a:tailEnd type="none" w="med" len="med"/>
+                    </a:lnT>
+                    <a:lnB w="5443" cap="flat" cmpd="sng" algn="ctr">
+                      <a:solidFill>
+                        <a:srgbClr val="DDDDDD"/>
+                      </a:solidFill>
+                      <a:prstDash val="solid"/>
+                      <a:round/>
+                      <a:headEnd type="none" w="med" len="med"/>
+                      <a:tailEnd type="none" w="med" len="med"/>
+                    </a:lnB>
+                    <a:solidFill>
+                      <a:srgbClr val="FFFFFF"/>
+                    </a:solidFill>
+                  </a:tcPr>
+                </a:tc>
+                <a:tc>
+                  <a:txBody>
+                    <a:bodyPr/>
+                    <a:lstStyle/>
+                    <a:p>
+                      <a:pPr algn="ctr"/>
+                      <a:r>
+                        <a:rPr lang="en-US" sz="2000" dirty="0">
+                          <a:effectLst/>
+                        </a:rPr>
+                        <a:t>15</a:t>
+                      </a:r>
+                    </a:p>
+                  </a:txBody>
+                  <a:tcPr marL="24568" marR="24568" marT="11339" marB="11339" anchor="ctr">
+                    <a:lnL w="5443" cap="flat" cmpd="sng" algn="ctr">
+                      <a:solidFill>
+                        <a:srgbClr val="DDDDDD"/>
+                      </a:solidFill>
+                      <a:prstDash val="solid"/>
+                      <a:round/>
+                      <a:headEnd type="none" w="med" len="med"/>
+                      <a:tailEnd type="none" w="med" len="med"/>
+                    </a:lnL>
+                    <a:lnR w="5443" cap="flat" cmpd="sng" algn="ctr">
+                      <a:solidFill>
+                        <a:srgbClr val="DDDDDD"/>
+                      </a:solidFill>
+                      <a:prstDash val="solid"/>
+                      <a:round/>
+                      <a:headEnd type="none" w="med" len="med"/>
+                      <a:tailEnd type="none" w="med" len="med"/>
+                    </a:lnR>
+                    <a:lnT w="5443" cap="flat" cmpd="sng" algn="ctr">
+                      <a:solidFill>
+                        <a:srgbClr val="DDDDDD"/>
+                      </a:solidFill>
+                      <a:prstDash val="solid"/>
+                      <a:round/>
+                      <a:headEnd type="none" w="med" len="med"/>
+                      <a:tailEnd type="none" w="med" len="med"/>
+                    </a:lnT>
+                    <a:lnB w="5443" cap="flat" cmpd="sng" algn="ctr">
+                      <a:solidFill>
+                        <a:srgbClr val="DDDDDD"/>
+                      </a:solidFill>
+                      <a:prstDash val="solid"/>
+                      <a:round/>
+                      <a:headEnd type="none" w="med" len="med"/>
+                      <a:tailEnd type="none" w="med" len="med"/>
+                    </a:lnB>
+                    <a:solidFill>
+                      <a:srgbClr val="FFFFFF"/>
+                    </a:solidFill>
+                  </a:tcPr>
+                </a:tc>
+                <a:extLst>
+                  <a:ext uri="{0D108BD9-81ED-4DB2-BD59-A6C34878D82A}">
+                    <a16:rowId xmlns:a16="http://schemas.microsoft.com/office/drawing/2014/main" val="3654752669"/>
+                  </a:ext>
+                </a:extLst>
+              </a:tr>
+            </a:tbl>
+          </a:graphicData>
+        </a:graphic>
+      </p:graphicFrame>
+      <p:sp>
+        <p:nvSpPr>
+          <p:cNvPr id="5" name="Rectangle 3"/>
+          <p:cNvSpPr>
+            <a:spLocks noChangeArrowheads="1"/>
+          </p:cNvSpPr>
+          <p:nvPr/>
+        </p:nvSpPr>
+        <p:spPr bwMode="auto">
+          <a:xfrm>
+            <a:off x="0" y="-323165"/>
+            <a:ext cx="6417298" cy="646331"/>
+          </a:xfrm>
+          <a:prstGeom prst="rect">
+            <a:avLst/>
+          </a:prstGeom>
+          <a:noFill/>
+          <a:ln>
+            <a:noFill/>
+          </a:ln>
+          <a:effectLst/>
+          <a:extLst>
+            <a:ext uri="{909E8E84-426E-40DD-AFC4-6F175D3DCCD1}">
+              <a14:hiddenFill xmlns:a14="http://schemas.microsoft.com/office/drawing/2010/main">
+                <a:solidFill>
+                  <a:schemeClr val="accent1"/>
+                </a:solidFill>
+              </a14:hiddenFill>
+            </a:ext>
+            <a:ext uri="{91240B29-F687-4F45-9708-019B960494DF}">
+              <a14:hiddenLine xmlns:a14="http://schemas.microsoft.com/office/drawing/2010/main" w="9525">
+                <a:solidFill>
+                  <a:schemeClr val="tx1"/>
+                </a:solidFill>
+                <a:miter lim="800000"/>
+                <a:headEnd/>
+                <a:tailEnd/>
+              </a14:hiddenLine>
+            </a:ext>
+            <a:ext uri="{AF507438-7753-43E0-B8FC-AC1667EBCBE1}">
+              <a14:hiddenEffects xmlns:a14="http://schemas.microsoft.com/office/drawing/2010/main">
+                <a:effectLst>
+                  <a:outerShdw dist="35921" dir="2700000" algn="ctr" rotWithShape="0">
+                    <a:schemeClr val="bg2"/>
+                  </a:outerShdw>
+                </a:effectLst>
+              </a14:hiddenEffects>
+            </a:ext>
+          </a:extLst>
+        </p:spPr>
+        <p:txBody>
+          <a:bodyPr vert="horz" wrap="square" lIns="91440" tIns="45720" rIns="91440" bIns="45720" numCol="1" anchor="ctr" anchorCtr="0" compatLnSpc="1">
+            <a:prstTxWarp prst="textNoShape">
+              <a:avLst/>
+            </a:prstTxWarp>
+            <a:spAutoFit/>
+          </a:bodyPr>
+          <a:lstStyle/>
+          <a:p>
+            <a:pPr marL="0" marR="0" lvl="0" indent="0" algn="l" defTabSz="914400" rtl="0" eaLnBrk="0" fontAlgn="base" latinLnBrk="0" hangingPunct="0">
+              <a:lnSpc>
+                <a:spcPct val="100000"/>
+              </a:lnSpc>
+              <a:spcBef>
+                <a:spcPct val="0"/>
+              </a:spcBef>
+              <a:spcAft>
+                <a:spcPct val="0"/>
+              </a:spcAft>
+              <a:buClrTx/>
+              <a:buSzTx/>
+              <a:buFontTx/>
+              <a:buNone/>
+              <a:tabLst/>
+            </a:pPr>
+            <a:br>
+              <a:rPr kumimoji="0" lang="en-US" altLang="en-US" sz="1800" b="0" i="0" u="none" strike="noStrike" cap="none" normalizeH="0" baseline="0">
+                <a:ln>
+                  <a:noFill/>
+                </a:ln>
+                <a:solidFill>
+                  <a:schemeClr val="tx1"/>
+                </a:solidFill>
+                <a:effectLst/>
+                <a:latin typeface="Arial" panose="020B0604020202020204" pitchFamily="34" charset="0"/>
+              </a:rPr>
+            </a:br>
+            <a:endParaRPr kumimoji="0" lang="en-US" altLang="en-US" sz="1800" b="0" i="0" u="none" strike="noStrike" cap="none" normalizeH="0" baseline="0">
+              <a:ln>
+                <a:noFill/>
+              </a:ln>
+              <a:solidFill>
+                <a:schemeClr val="tx1"/>
+              </a:solidFill>
+              <a:effectLst/>
+              <a:latin typeface="Arial" panose="020B0604020202020204" pitchFamily="34" charset="0"/>
+            </a:endParaRPr>
+          </a:p>
+        </p:txBody>
+      </p:sp>
+    </p:spTree>
+    <p:extLst>
+      <p:ext uri="{BB962C8B-B14F-4D97-AF65-F5344CB8AC3E}">
+        <p14:creationId xmlns:p14="http://schemas.microsoft.com/office/powerpoint/2010/main" val="1251222904"/>
       </p:ext>
     </p:extLst>
   </p:cSld>

</xml_diff>

<commit_message>
updated to support the code
</commit_message>
<xml_diff>
--- a/Philadelphia Code Camp.pptx
+++ b/Philadelphia Code Camp.pptx
@@ -40,7 +40,14 @@
     <p:sldId id="308" r:id="rId34"/>
     <p:sldId id="266" r:id="rId35"/>
     <p:sldId id="310" r:id="rId36"/>
-    <p:sldId id="311" r:id="rId37"/>
+    <p:sldId id="314" r:id="rId37"/>
+    <p:sldId id="315" r:id="rId38"/>
+    <p:sldId id="313" r:id="rId39"/>
+    <p:sldId id="312" r:id="rId40"/>
+    <p:sldId id="316" r:id="rId41"/>
+    <p:sldId id="317" r:id="rId42"/>
+    <p:sldId id="318" r:id="rId43"/>
+    <p:sldId id="311" r:id="rId44"/>
   </p:sldIdLst>
   <p:sldSz cx="12192000" cy="6858000"/>
   <p:notesSz cx="6858000" cy="9144000"/>
@@ -214,6 +221,13 @@
         </p14:section>
         <p14:section name="Lesson 7 - Drone Car" id="{ED7258B8-CAC7-4C2D-AB65-3CC3C6C419D6}">
           <p14:sldIdLst>
+            <p14:sldId id="314"/>
+            <p14:sldId id="315"/>
+            <p14:sldId id="313"/>
+            <p14:sldId id="312"/>
+            <p14:sldId id="316"/>
+            <p14:sldId id="317"/>
+            <p14:sldId id="318"/>
             <p14:sldId id="311"/>
           </p14:sldIdLst>
         </p14:section>
@@ -366,7 +380,7 @@
           <a:p>
             <a:fld id="{0C877353-E782-4104-A72D-F21DF2D84710}" type="datetimeFigureOut">
               <a:rPr lang="en-US" smtClean="0"/>
-              <a:t>2/23/2017</a:t>
+              <a:t>2/24/2017</a:t>
             </a:fld>
             <a:endParaRPr lang="en-US"/>
           </a:p>
@@ -534,7 +548,7 @@
           <a:p>
             <a:fld id="{0C877353-E782-4104-A72D-F21DF2D84710}" type="datetimeFigureOut">
               <a:rPr lang="en-US" smtClean="0"/>
-              <a:t>2/23/2017</a:t>
+              <a:t>2/24/2017</a:t>
             </a:fld>
             <a:endParaRPr lang="en-US"/>
           </a:p>
@@ -712,7 +726,7 @@
           <a:p>
             <a:fld id="{0C877353-E782-4104-A72D-F21DF2D84710}" type="datetimeFigureOut">
               <a:rPr lang="en-US" smtClean="0"/>
-              <a:t>2/23/2017</a:t>
+              <a:t>2/24/2017</a:t>
             </a:fld>
             <a:endParaRPr lang="en-US"/>
           </a:p>
@@ -880,7 +894,7 @@
           <a:p>
             <a:fld id="{0C877353-E782-4104-A72D-F21DF2D84710}" type="datetimeFigureOut">
               <a:rPr lang="en-US" smtClean="0"/>
-              <a:t>2/23/2017</a:t>
+              <a:t>2/24/2017</a:t>
             </a:fld>
             <a:endParaRPr lang="en-US"/>
           </a:p>
@@ -1125,7 +1139,7 @@
           <a:p>
             <a:fld id="{0C877353-E782-4104-A72D-F21DF2D84710}" type="datetimeFigureOut">
               <a:rPr lang="en-US" smtClean="0"/>
-              <a:t>2/23/2017</a:t>
+              <a:t>2/24/2017</a:t>
             </a:fld>
             <a:endParaRPr lang="en-US"/>
           </a:p>
@@ -1354,7 +1368,7 @@
           <a:p>
             <a:fld id="{0C877353-E782-4104-A72D-F21DF2D84710}" type="datetimeFigureOut">
               <a:rPr lang="en-US" smtClean="0"/>
-              <a:t>2/23/2017</a:t>
+              <a:t>2/24/2017</a:t>
             </a:fld>
             <a:endParaRPr lang="en-US"/>
           </a:p>
@@ -1718,7 +1732,7 @@
           <a:p>
             <a:fld id="{0C877353-E782-4104-A72D-F21DF2D84710}" type="datetimeFigureOut">
               <a:rPr lang="en-US" smtClean="0"/>
-              <a:t>2/23/2017</a:t>
+              <a:t>2/24/2017</a:t>
             </a:fld>
             <a:endParaRPr lang="en-US"/>
           </a:p>
@@ -1835,7 +1849,7 @@
           <a:p>
             <a:fld id="{0C877353-E782-4104-A72D-F21DF2D84710}" type="datetimeFigureOut">
               <a:rPr lang="en-US" smtClean="0"/>
-              <a:t>2/23/2017</a:t>
+              <a:t>2/24/2017</a:t>
             </a:fld>
             <a:endParaRPr lang="en-US"/>
           </a:p>
@@ -1930,7 +1944,7 @@
           <a:p>
             <a:fld id="{0C877353-E782-4104-A72D-F21DF2D84710}" type="datetimeFigureOut">
               <a:rPr lang="en-US" smtClean="0"/>
-              <a:t>2/23/2017</a:t>
+              <a:t>2/24/2017</a:t>
             </a:fld>
             <a:endParaRPr lang="en-US"/>
           </a:p>
@@ -2205,7 +2219,7 @@
           <a:p>
             <a:fld id="{0C877353-E782-4104-A72D-F21DF2D84710}" type="datetimeFigureOut">
               <a:rPr lang="en-US" smtClean="0"/>
-              <a:t>2/23/2017</a:t>
+              <a:t>2/24/2017</a:t>
             </a:fld>
             <a:endParaRPr lang="en-US"/>
           </a:p>
@@ -2457,7 +2471,7 @@
           <a:p>
             <a:fld id="{0C877353-E782-4104-A72D-F21DF2D84710}" type="datetimeFigureOut">
               <a:rPr lang="en-US" smtClean="0"/>
-              <a:t>2/23/2017</a:t>
+              <a:t>2/24/2017</a:t>
             </a:fld>
             <a:endParaRPr lang="en-US"/>
           </a:p>
@@ -2668,7 +2682,7 @@
           <a:p>
             <a:fld id="{0C877353-E782-4104-A72D-F21DF2D84710}" type="datetimeFigureOut">
               <a:rPr lang="en-US" smtClean="0"/>
-              <a:t>2/23/2017</a:t>
+              <a:t>2/24/2017</a:t>
             </a:fld>
             <a:endParaRPr lang="en-US"/>
           </a:p>
@@ -9936,6 +9950,36 @@
           <a:chExt cx="0" cy="0"/>
         </a:xfrm>
       </p:grpSpPr>
+      <p:pic>
+        <p:nvPicPr>
+          <p:cNvPr id="3076" name="Picture 2" descr="https://hackster.imgix.net/uploads/image/file/54688/L298N_5venable_jumper.jpg?w=1280&amp;h=960&amp;fit=max&amp;fm=jpg"/>
+          <p:cNvPicPr>
+            <a:picLocks noChangeAspect="1"/>
+          </p:cNvPicPr>
+          <p:nvPr/>
+        </p:nvPicPr>
+        <p:blipFill rotWithShape="1">
+          <a:blip r:embed="rId2">
+            <a:extLst>
+              <a:ext uri="{28A0092B-C50C-407E-A947-70E740481C1C}">
+                <a14:useLocalDpi xmlns:a14="http://schemas.microsoft.com/office/drawing/2010/main" val="0"/>
+              </a:ext>
+            </a:extLst>
+          </a:blip>
+          <a:srcRect r="7004" b="1"/>
+          <a:stretch/>
+        </p:blipFill>
+        <p:spPr>
+          <a:xfrm>
+            <a:off x="4636008" y="640082"/>
+            <a:ext cx="6916329" cy="5577837"/>
+          </a:xfrm>
+          <a:prstGeom prst="rect">
+            <a:avLst/>
+          </a:prstGeom>
+          <a:effectLst/>
+        </p:spPr>
+      </p:pic>
       <p:sp>
         <p:nvSpPr>
           <p:cNvPr id="2" name="Title 1"/>
@@ -9949,7 +9993,7 @@
         <p:spPr>
           <a:xfrm>
             <a:off x="648929" y="629266"/>
-            <a:ext cx="9419303" cy="1676603"/>
+            <a:ext cx="3667039" cy="1676603"/>
           </a:xfrm>
         </p:spPr>
         <p:txBody>
@@ -9960,14 +10004,14 @@
           <a:p>
             <a:r>
               <a:rPr lang="en-US" dirty="0"/>
-              <a:t>Installing Raspberry Pi Camera v2</a:t>
-            </a:r>
-          </a:p>
-        </p:txBody>
-      </p:sp>
-      <p:sp>
-        <p:nvSpPr>
-          <p:cNvPr id="3" name="Content Placeholder 2"/>
+              <a:t>L298N</a:t>
+            </a:r>
+          </a:p>
+        </p:txBody>
+      </p:sp>
+      <p:sp>
+        <p:nvSpPr>
+          <p:cNvPr id="3078" name="Content Placeholder 3077"/>
           <p:cNvSpPr>
             <a:spLocks noGrp="1"/>
           </p:cNvSpPr>
@@ -9975,41 +10019,389 @@
             <p:ph idx="1"/>
           </p:nvPr>
         </p:nvSpPr>
-        <p:spPr/>
-        <p:txBody>
-          <a:bodyPr/>
-          <a:lstStyle/>
-          <a:p>
-            <a:r>
-              <a:rPr lang="en-US" dirty="0"/>
-              <a:t>Currently, there is driver issues with Raspberry Pi Camera 2 and Motion Library</a:t>
-            </a:r>
-          </a:p>
-          <a:p>
-            <a:r>
-              <a:rPr lang="en-US" dirty="0"/>
-              <a:t>I’ve updated and fixed this in the repo</a:t>
-            </a:r>
-          </a:p>
-          <a:p>
-            <a:r>
-              <a:rPr lang="en-US" dirty="0"/>
-              <a:t>Please Go to Lesson 6 – Drone Car</a:t>
-            </a:r>
-          </a:p>
-          <a:p>
-            <a:pPr lvl="1"/>
-            <a:r>
-              <a:rPr lang="en-US" dirty="0"/>
-              <a:t>ReadMe.txt</a:t>
-            </a:r>
+        <p:spPr>
+          <a:xfrm>
+            <a:off x="648930" y="2438400"/>
+            <a:ext cx="3667037" cy="3785419"/>
+          </a:xfrm>
+        </p:spPr>
+        <p:txBody>
+          <a:bodyPr>
+            <a:normAutofit/>
+          </a:bodyPr>
+          <a:lstStyle/>
+          <a:p>
+            <a:r>
+              <a:rPr lang="en-US" dirty="0"/>
+              <a:t>The L298N motor driver allows you to spin the motors forwards AND backwards using a handful of GPIO pins</a:t>
+            </a:r>
+            <a:endParaRPr lang="en-US" sz="1800" dirty="0"/>
           </a:p>
         </p:txBody>
       </p:sp>
     </p:spTree>
     <p:extLst>
       <p:ext uri="{BB962C8B-B14F-4D97-AF65-F5344CB8AC3E}">
-        <p14:creationId xmlns:p14="http://schemas.microsoft.com/office/powerpoint/2010/main" val="1403893181"/>
+        <p14:creationId xmlns:p14="http://schemas.microsoft.com/office/powerpoint/2010/main" val="3959902308"/>
+      </p:ext>
+    </p:extLst>
+  </p:cSld>
+  <p:clrMapOvr>
+    <a:masterClrMapping/>
+  </p:clrMapOvr>
+</p:sld>
+</file>
+
+<file path=ppt/slides/slide37.xml><?xml version="1.0" encoding="utf-8"?>
+<p:sld xmlns:a="http://schemas.openxmlformats.org/drawingml/2006/main" xmlns:r="http://schemas.openxmlformats.org/officeDocument/2006/relationships" xmlns:p="http://schemas.openxmlformats.org/presentationml/2006/main">
+  <p:cSld>
+    <p:spTree>
+      <p:nvGrpSpPr>
+        <p:cNvPr id="1" name=""/>
+        <p:cNvGrpSpPr/>
+        <p:nvPr/>
+      </p:nvGrpSpPr>
+      <p:grpSpPr>
+        <a:xfrm>
+          <a:off x="0" y="0"/>
+          <a:ext cx="0" cy="0"/>
+          <a:chOff x="0" y="0"/>
+          <a:chExt cx="0" cy="0"/>
+        </a:xfrm>
+      </p:grpSpPr>
+      <p:pic>
+        <p:nvPicPr>
+          <p:cNvPr id="4" name="Picture 2" descr="https://hackster.imgix.net/uploads/image/file/54688/L298N_5venable_jumper.jpg?w=1280&amp;h=960&amp;fit=max&amp;fm=jpg"/>
+          <p:cNvPicPr>
+            <a:picLocks noChangeAspect="1"/>
+          </p:cNvPicPr>
+          <p:nvPr/>
+        </p:nvPicPr>
+        <p:blipFill rotWithShape="1">
+          <a:blip r:embed="rId2">
+            <a:extLst>
+              <a:ext uri="{28A0092B-C50C-407E-A947-70E740481C1C}">
+                <a14:useLocalDpi xmlns:a14="http://schemas.microsoft.com/office/drawing/2010/main" val="0"/>
+              </a:ext>
+            </a:extLst>
+          </a:blip>
+          <a:srcRect r="17400"/>
+          <a:stretch/>
+        </p:blipFill>
+        <p:spPr>
+          <a:xfrm>
+            <a:off x="4639056" y="10"/>
+            <a:ext cx="7552944" cy="6857990"/>
+          </a:xfrm>
+          <a:prstGeom prst="rect">
+            <a:avLst/>
+          </a:prstGeom>
+          <a:effectLst/>
+        </p:spPr>
+      </p:pic>
+      <p:sp>
+        <p:nvSpPr>
+          <p:cNvPr id="2" name="Title 1"/>
+          <p:cNvSpPr>
+            <a:spLocks noGrp="1"/>
+          </p:cNvSpPr>
+          <p:nvPr>
+            <p:ph type="title"/>
+          </p:nvPr>
+        </p:nvSpPr>
+        <p:spPr>
+          <a:xfrm>
+            <a:off x="648929" y="629266"/>
+            <a:ext cx="3651467" cy="1676603"/>
+          </a:xfrm>
+        </p:spPr>
+        <p:txBody>
+          <a:bodyPr>
+            <a:normAutofit/>
+          </a:bodyPr>
+          <a:lstStyle/>
+          <a:p>
+            <a:r>
+              <a:rPr lang="en-US" dirty="0"/>
+              <a:t>Link Power to Raspberry Pi</a:t>
+            </a:r>
+          </a:p>
+        </p:txBody>
+      </p:sp>
+      <p:sp>
+        <p:nvSpPr>
+          <p:cNvPr id="3" name="Content Placeholder 2"/>
+          <p:cNvSpPr>
+            <a:spLocks noGrp="1"/>
+          </p:cNvSpPr>
+          <p:nvPr>
+            <p:ph idx="1"/>
+          </p:nvPr>
+        </p:nvSpPr>
+        <p:spPr>
+          <a:xfrm>
+            <a:off x="648931" y="2438400"/>
+            <a:ext cx="3651466" cy="3785419"/>
+          </a:xfrm>
+        </p:spPr>
+        <p:txBody>
+          <a:bodyPr>
+            <a:normAutofit/>
+          </a:bodyPr>
+          <a:lstStyle/>
+          <a:p>
+            <a:r>
+              <a:rPr lang="en-US" sz="1800"/>
+              <a:t>We are setting up the L298N, we’ll go ahead and link the power from the Raspberry Pi to the L298N. </a:t>
+            </a:r>
+          </a:p>
+          <a:p>
+            <a:r>
+              <a:rPr lang="en-US" sz="1800"/>
+              <a:t>First, remove the physical jumper – labeled ‘5v enable’ in the photo – from the L298N. </a:t>
+            </a:r>
+          </a:p>
+          <a:p>
+            <a:r>
+              <a:rPr lang="en-US" sz="1800"/>
+              <a:t>This sets the motor controller logic to be powered by the Raspberry Pi via the +5v terminal on the power block rather than from the power source connected to the +12v terminal.</a:t>
+            </a:r>
+          </a:p>
+        </p:txBody>
+      </p:sp>
+    </p:spTree>
+    <p:extLst>
+      <p:ext uri="{BB962C8B-B14F-4D97-AF65-F5344CB8AC3E}">
+        <p14:creationId xmlns:p14="http://schemas.microsoft.com/office/powerpoint/2010/main" val="2887734539"/>
+      </p:ext>
+    </p:extLst>
+  </p:cSld>
+  <p:clrMapOvr>
+    <a:masterClrMapping/>
+  </p:clrMapOvr>
+</p:sld>
+</file>
+
+<file path=ppt/slides/slide38.xml><?xml version="1.0" encoding="utf-8"?>
+<p:sld xmlns:a="http://schemas.openxmlformats.org/drawingml/2006/main" xmlns:r="http://schemas.openxmlformats.org/officeDocument/2006/relationships" xmlns:p="http://schemas.openxmlformats.org/presentationml/2006/main">
+  <p:cSld>
+    <p:spTree>
+      <p:nvGrpSpPr>
+        <p:cNvPr id="1" name=""/>
+        <p:cNvGrpSpPr/>
+        <p:nvPr/>
+      </p:nvGrpSpPr>
+      <p:grpSpPr>
+        <a:xfrm>
+          <a:off x="0" y="0"/>
+          <a:ext cx="0" cy="0"/>
+          <a:chOff x="0" y="0"/>
+          <a:chExt cx="0" cy="0"/>
+        </a:xfrm>
+      </p:grpSpPr>
+      <p:sp>
+        <p:nvSpPr>
+          <p:cNvPr id="2" name="Title 1"/>
+          <p:cNvSpPr>
+            <a:spLocks noGrp="1"/>
+          </p:cNvSpPr>
+          <p:nvPr>
+            <p:ph type="title"/>
+          </p:nvPr>
+        </p:nvSpPr>
+        <p:spPr/>
+        <p:txBody>
+          <a:bodyPr/>
+          <a:lstStyle/>
+          <a:p>
+            <a:r>
+              <a:rPr lang="en-US" dirty="0"/>
+              <a:t>GPIO Ports</a:t>
+            </a:r>
+          </a:p>
+        </p:txBody>
+      </p:sp>
+      <p:sp>
+        <p:nvSpPr>
+          <p:cNvPr id="3" name="Content Placeholder 2"/>
+          <p:cNvSpPr>
+            <a:spLocks noGrp="1"/>
+          </p:cNvSpPr>
+          <p:nvPr>
+            <p:ph idx="1"/>
+          </p:nvPr>
+        </p:nvSpPr>
+        <p:spPr/>
+        <p:txBody>
+          <a:bodyPr/>
+          <a:lstStyle/>
+          <a:p>
+            <a:r>
+              <a:rPr lang="en-US" dirty="0"/>
+              <a:t> IN1 -&gt; GPIO 27 / physical 13</a:t>
+            </a:r>
+          </a:p>
+          <a:p>
+            <a:r>
+              <a:rPr lang="en-US" dirty="0"/>
+              <a:t> IN2 -&gt; GPIO 22 / physical 15</a:t>
+            </a:r>
+          </a:p>
+          <a:p>
+            <a:r>
+              <a:rPr lang="en-US" dirty="0"/>
+              <a:t> IN3 -&gt; GPIO 5 / physical 29</a:t>
+            </a:r>
+          </a:p>
+          <a:p>
+            <a:r>
+              <a:rPr lang="en-US" dirty="0"/>
+              <a:t> IN4 -&gt; GPIO 6 / physical 31</a:t>
+            </a:r>
+          </a:p>
+          <a:p>
+            <a:endParaRPr lang="en-US" dirty="0"/>
+          </a:p>
+        </p:txBody>
+      </p:sp>
+      <p:pic>
+        <p:nvPicPr>
+          <p:cNvPr id="2050" name="Picture 2" descr="https://hackster.imgix.net/uploads/image/file/54687/L298N.jpg?w=1280&amp;h=960&amp;fit=max&amp;fm=jpg"/>
+          <p:cNvPicPr>
+            <a:picLocks noChangeAspect="1" noChangeArrowheads="1"/>
+          </p:cNvPicPr>
+          <p:nvPr/>
+        </p:nvPicPr>
+        <p:blipFill>
+          <a:blip r:embed="rId2">
+            <a:extLst>
+              <a:ext uri="{28A0092B-C50C-407E-A947-70E740481C1C}">
+                <a14:useLocalDpi xmlns:a14="http://schemas.microsoft.com/office/drawing/2010/main" val="0"/>
+              </a:ext>
+            </a:extLst>
+          </a:blip>
+          <a:srcRect/>
+          <a:stretch>
+            <a:fillRect/>
+          </a:stretch>
+        </p:blipFill>
+        <p:spPr bwMode="auto">
+          <a:xfrm>
+            <a:off x="6656736" y="1586377"/>
+            <a:ext cx="4120918" cy="4120918"/>
+          </a:xfrm>
+          <a:prstGeom prst="rect">
+            <a:avLst/>
+          </a:prstGeom>
+          <a:noFill/>
+          <a:extLst>
+            <a:ext uri="{909E8E84-426E-40DD-AFC4-6F175D3DCCD1}">
+              <a14:hiddenFill xmlns:a14="http://schemas.microsoft.com/office/drawing/2010/main">
+                <a:solidFill>
+                  <a:srgbClr val="FFFFFF"/>
+                </a:solidFill>
+              </a14:hiddenFill>
+            </a:ext>
+          </a:extLst>
+        </p:spPr>
+      </p:pic>
+    </p:spTree>
+    <p:extLst>
+      <p:ext uri="{BB962C8B-B14F-4D97-AF65-F5344CB8AC3E}">
+        <p14:creationId xmlns:p14="http://schemas.microsoft.com/office/powerpoint/2010/main" val="1917029364"/>
+      </p:ext>
+    </p:extLst>
+  </p:cSld>
+  <p:clrMapOvr>
+    <a:masterClrMapping/>
+  </p:clrMapOvr>
+</p:sld>
+</file>
+
+<file path=ppt/slides/slide39.xml><?xml version="1.0" encoding="utf-8"?>
+<p:sld xmlns:a="http://schemas.openxmlformats.org/drawingml/2006/main" xmlns:r="http://schemas.openxmlformats.org/officeDocument/2006/relationships" xmlns:p="http://schemas.openxmlformats.org/presentationml/2006/main">
+  <p:cSld>
+    <p:spTree>
+      <p:nvGrpSpPr>
+        <p:cNvPr id="1" name=""/>
+        <p:cNvGrpSpPr/>
+        <p:nvPr/>
+      </p:nvGrpSpPr>
+      <p:grpSpPr>
+        <a:xfrm>
+          <a:off x="0" y="0"/>
+          <a:ext cx="0" cy="0"/>
+          <a:chOff x="0" y="0"/>
+          <a:chExt cx="0" cy="0"/>
+        </a:xfrm>
+      </p:grpSpPr>
+      <p:sp>
+        <p:nvSpPr>
+          <p:cNvPr id="2" name="Title 1"/>
+          <p:cNvSpPr>
+            <a:spLocks noGrp="1"/>
+          </p:cNvSpPr>
+          <p:nvPr>
+            <p:ph type="title"/>
+          </p:nvPr>
+        </p:nvSpPr>
+        <p:spPr/>
+        <p:txBody>
+          <a:bodyPr/>
+          <a:lstStyle/>
+          <a:p>
+            <a:r>
+              <a:rPr lang="en-US" dirty="0"/>
+              <a:t>Build Overview</a:t>
+            </a:r>
+          </a:p>
+        </p:txBody>
+      </p:sp>
+      <p:pic>
+        <p:nvPicPr>
+          <p:cNvPr id="1028" name="Picture 4" descr="https://hackster.imgix.net/uploads/image/file/54689/rover_step2.jpg?w=680&amp;h=510&amp;fit=max&amp;fm=jpg"/>
+          <p:cNvPicPr>
+            <a:picLocks noChangeAspect="1" noChangeArrowheads="1"/>
+          </p:cNvPicPr>
+          <p:nvPr/>
+        </p:nvPicPr>
+        <p:blipFill>
+          <a:blip r:embed="rId2">
+            <a:extLst>
+              <a:ext uri="{28A0092B-C50C-407E-A947-70E740481C1C}">
+                <a14:useLocalDpi xmlns:a14="http://schemas.microsoft.com/office/drawing/2010/main" val="0"/>
+              </a:ext>
+            </a:extLst>
+          </a:blip>
+          <a:srcRect/>
+          <a:stretch>
+            <a:fillRect/>
+          </a:stretch>
+        </p:blipFill>
+        <p:spPr bwMode="auto">
+          <a:xfrm>
+            <a:off x="1099472" y="1205344"/>
+            <a:ext cx="10178128" cy="5927264"/>
+          </a:xfrm>
+          <a:prstGeom prst="rect">
+            <a:avLst/>
+          </a:prstGeom>
+          <a:noFill/>
+          <a:extLst>
+            <a:ext uri="{909E8E84-426E-40DD-AFC4-6F175D3DCCD1}">
+              <a14:hiddenFill xmlns:a14="http://schemas.microsoft.com/office/drawing/2010/main">
+                <a:solidFill>
+                  <a:srgbClr val="FFFFFF"/>
+                </a:solidFill>
+              </a14:hiddenFill>
+            </a:ext>
+          </a:extLst>
+        </p:spPr>
+      </p:pic>
+    </p:spTree>
+    <p:extLst>
+      <p:ext uri="{BB962C8B-B14F-4D97-AF65-F5344CB8AC3E}">
+        <p14:creationId xmlns:p14="http://schemas.microsoft.com/office/powerpoint/2010/main" val="3595403135"/>
       </p:ext>
     </p:extLst>
   </p:cSld>
@@ -10183,6 +10575,338 @@
     <p:extLst>
       <p:ext uri="{BB962C8B-B14F-4D97-AF65-F5344CB8AC3E}">
         <p14:creationId xmlns:p14="http://schemas.microsoft.com/office/powerpoint/2010/main" val="3572186423"/>
+      </p:ext>
+    </p:extLst>
+  </p:cSld>
+  <p:clrMapOvr>
+    <a:masterClrMapping/>
+  </p:clrMapOvr>
+</p:sld>
+</file>
+
+<file path=ppt/slides/slide40.xml><?xml version="1.0" encoding="utf-8"?>
+<p:sld xmlns:a="http://schemas.openxmlformats.org/drawingml/2006/main" xmlns:r="http://schemas.openxmlformats.org/officeDocument/2006/relationships" xmlns:p="http://schemas.openxmlformats.org/presentationml/2006/main">
+  <p:cSld>
+    <p:spTree>
+      <p:nvGrpSpPr>
+        <p:cNvPr id="1" name=""/>
+        <p:cNvGrpSpPr/>
+        <p:nvPr/>
+      </p:nvGrpSpPr>
+      <p:grpSpPr>
+        <a:xfrm>
+          <a:off x="0" y="0"/>
+          <a:ext cx="0" cy="0"/>
+          <a:chOff x="0" y="0"/>
+          <a:chExt cx="0" cy="0"/>
+        </a:xfrm>
+      </p:grpSpPr>
+      <p:sp>
+        <p:nvSpPr>
+          <p:cNvPr id="2" name="Title 1"/>
+          <p:cNvSpPr>
+            <a:spLocks noGrp="1"/>
+          </p:cNvSpPr>
+          <p:nvPr>
+            <p:ph type="title"/>
+          </p:nvPr>
+        </p:nvSpPr>
+        <p:spPr/>
+        <p:txBody>
+          <a:bodyPr/>
+          <a:lstStyle/>
+          <a:p>
+            <a:r>
+              <a:rPr lang="en-US" dirty="0"/>
+              <a:t>Keyboard Drone	</a:t>
+            </a:r>
+          </a:p>
+        </p:txBody>
+      </p:sp>
+      <p:sp>
+        <p:nvSpPr>
+          <p:cNvPr id="3" name="Content Placeholder 2"/>
+          <p:cNvSpPr>
+            <a:spLocks noGrp="1"/>
+          </p:cNvSpPr>
+          <p:nvPr>
+            <p:ph idx="1"/>
+          </p:nvPr>
+        </p:nvSpPr>
+        <p:spPr/>
+        <p:txBody>
+          <a:bodyPr/>
+          <a:lstStyle/>
+          <a:p>
+            <a:r>
+              <a:rPr lang="en-US" dirty="0"/>
+              <a:t>Manual Control Drone via SSH/Terminal</a:t>
+            </a:r>
+          </a:p>
+        </p:txBody>
+      </p:sp>
+    </p:spTree>
+    <p:extLst>
+      <p:ext uri="{BB962C8B-B14F-4D97-AF65-F5344CB8AC3E}">
+        <p14:creationId xmlns:p14="http://schemas.microsoft.com/office/powerpoint/2010/main" val="2144614067"/>
+      </p:ext>
+    </p:extLst>
+  </p:cSld>
+  <p:clrMapOvr>
+    <a:masterClrMapping/>
+  </p:clrMapOvr>
+</p:sld>
+</file>
+
+<file path=ppt/slides/slide41.xml><?xml version="1.0" encoding="utf-8"?>
+<p:sld xmlns:a="http://schemas.openxmlformats.org/drawingml/2006/main" xmlns:r="http://schemas.openxmlformats.org/officeDocument/2006/relationships" xmlns:p="http://schemas.openxmlformats.org/presentationml/2006/main">
+  <p:cSld>
+    <p:spTree>
+      <p:nvGrpSpPr>
+        <p:cNvPr id="1" name=""/>
+        <p:cNvGrpSpPr/>
+        <p:nvPr/>
+      </p:nvGrpSpPr>
+      <p:grpSpPr>
+        <a:xfrm>
+          <a:off x="0" y="0"/>
+          <a:ext cx="0" cy="0"/>
+          <a:chOff x="0" y="0"/>
+          <a:chExt cx="0" cy="0"/>
+        </a:xfrm>
+      </p:grpSpPr>
+      <p:sp>
+        <p:nvSpPr>
+          <p:cNvPr id="2" name="Title 1"/>
+          <p:cNvSpPr>
+            <a:spLocks noGrp="1"/>
+          </p:cNvSpPr>
+          <p:nvPr>
+            <p:ph type="title"/>
+          </p:nvPr>
+        </p:nvSpPr>
+        <p:spPr/>
+        <p:txBody>
+          <a:bodyPr/>
+          <a:lstStyle/>
+          <a:p>
+            <a:r>
+              <a:rPr lang="en-US" dirty="0" err="1"/>
+              <a:t>Pokemon</a:t>
+            </a:r>
+            <a:r>
+              <a:rPr lang="en-US" dirty="0"/>
+              <a:t> Go Drone Car</a:t>
+            </a:r>
+          </a:p>
+        </p:txBody>
+      </p:sp>
+      <p:sp>
+        <p:nvSpPr>
+          <p:cNvPr id="3" name="Content Placeholder 2"/>
+          <p:cNvSpPr>
+            <a:spLocks noGrp="1"/>
+          </p:cNvSpPr>
+          <p:nvPr>
+            <p:ph idx="1"/>
+          </p:nvPr>
+        </p:nvSpPr>
+        <p:spPr/>
+        <p:txBody>
+          <a:bodyPr/>
+          <a:lstStyle/>
+          <a:p>
+            <a:r>
+              <a:rPr lang="en-US" dirty="0"/>
+              <a:t>Automate a path for your via Code</a:t>
+            </a:r>
+          </a:p>
+        </p:txBody>
+      </p:sp>
+    </p:spTree>
+    <p:extLst>
+      <p:ext uri="{BB962C8B-B14F-4D97-AF65-F5344CB8AC3E}">
+        <p14:creationId xmlns:p14="http://schemas.microsoft.com/office/powerpoint/2010/main" val="2052519995"/>
+      </p:ext>
+    </p:extLst>
+  </p:cSld>
+  <p:clrMapOvr>
+    <a:masterClrMapping/>
+  </p:clrMapOvr>
+</p:sld>
+</file>
+
+<file path=ppt/slides/slide42.xml><?xml version="1.0" encoding="utf-8"?>
+<p:sld xmlns:a="http://schemas.openxmlformats.org/drawingml/2006/main" xmlns:r="http://schemas.openxmlformats.org/officeDocument/2006/relationships" xmlns:p="http://schemas.openxmlformats.org/presentationml/2006/main">
+  <p:cSld>
+    <p:spTree>
+      <p:nvGrpSpPr>
+        <p:cNvPr id="1" name=""/>
+        <p:cNvGrpSpPr/>
+        <p:nvPr/>
+      </p:nvGrpSpPr>
+      <p:grpSpPr>
+        <a:xfrm>
+          <a:off x="0" y="0"/>
+          <a:ext cx="0" cy="0"/>
+          <a:chOff x="0" y="0"/>
+          <a:chExt cx="0" cy="0"/>
+        </a:xfrm>
+      </p:grpSpPr>
+      <p:sp>
+        <p:nvSpPr>
+          <p:cNvPr id="2" name="Title 1"/>
+          <p:cNvSpPr>
+            <a:spLocks noGrp="1"/>
+          </p:cNvSpPr>
+          <p:nvPr>
+            <p:ph type="title"/>
+          </p:nvPr>
+        </p:nvSpPr>
+        <p:spPr/>
+        <p:txBody>
+          <a:bodyPr/>
+          <a:lstStyle/>
+          <a:p>
+            <a:r>
+              <a:rPr lang="en-US" dirty="0"/>
+              <a:t>Adding Eyes to Drone Car</a:t>
+            </a:r>
+          </a:p>
+        </p:txBody>
+      </p:sp>
+      <p:sp>
+        <p:nvSpPr>
+          <p:cNvPr id="3" name="Content Placeholder 2"/>
+          <p:cNvSpPr>
+            <a:spLocks noGrp="1"/>
+          </p:cNvSpPr>
+          <p:nvPr>
+            <p:ph idx="1"/>
+          </p:nvPr>
+        </p:nvSpPr>
+        <p:spPr/>
+        <p:txBody>
+          <a:bodyPr/>
+          <a:lstStyle/>
+          <a:p>
+            <a:r>
+              <a:rPr lang="en-US" dirty="0"/>
+              <a:t>Follow ReadMe.txt in Lesson 6</a:t>
+            </a:r>
+          </a:p>
+          <a:p>
+            <a:r>
+              <a:rPr lang="en-US" dirty="0"/>
+              <a:t>This will depend on each person’s camera they purchased</a:t>
+            </a:r>
+          </a:p>
+        </p:txBody>
+      </p:sp>
+    </p:spTree>
+    <p:extLst>
+      <p:ext uri="{BB962C8B-B14F-4D97-AF65-F5344CB8AC3E}">
+        <p14:creationId xmlns:p14="http://schemas.microsoft.com/office/powerpoint/2010/main" val="3953508719"/>
+      </p:ext>
+    </p:extLst>
+  </p:cSld>
+  <p:clrMapOvr>
+    <a:masterClrMapping/>
+  </p:clrMapOvr>
+</p:sld>
+</file>
+
+<file path=ppt/slides/slide43.xml><?xml version="1.0" encoding="utf-8"?>
+<p:sld xmlns:a="http://schemas.openxmlformats.org/drawingml/2006/main" xmlns:r="http://schemas.openxmlformats.org/officeDocument/2006/relationships" xmlns:p="http://schemas.openxmlformats.org/presentationml/2006/main">
+  <p:cSld>
+    <p:spTree>
+      <p:nvGrpSpPr>
+        <p:cNvPr id="1" name=""/>
+        <p:cNvGrpSpPr/>
+        <p:nvPr/>
+      </p:nvGrpSpPr>
+      <p:grpSpPr>
+        <a:xfrm>
+          <a:off x="0" y="0"/>
+          <a:ext cx="0" cy="0"/>
+          <a:chOff x="0" y="0"/>
+          <a:chExt cx="0" cy="0"/>
+        </a:xfrm>
+      </p:grpSpPr>
+      <p:sp>
+        <p:nvSpPr>
+          <p:cNvPr id="2" name="Title 1"/>
+          <p:cNvSpPr>
+            <a:spLocks noGrp="1"/>
+          </p:cNvSpPr>
+          <p:nvPr>
+            <p:ph type="title"/>
+          </p:nvPr>
+        </p:nvSpPr>
+        <p:spPr>
+          <a:xfrm>
+            <a:off x="648929" y="629266"/>
+            <a:ext cx="9419303" cy="1676603"/>
+          </a:xfrm>
+        </p:spPr>
+        <p:txBody>
+          <a:bodyPr>
+            <a:normAutofit/>
+          </a:bodyPr>
+          <a:lstStyle/>
+          <a:p>
+            <a:r>
+              <a:rPr lang="en-US" dirty="0"/>
+              <a:t>Installing Raspberry Pi Camera v2</a:t>
+            </a:r>
+          </a:p>
+        </p:txBody>
+      </p:sp>
+      <p:sp>
+        <p:nvSpPr>
+          <p:cNvPr id="3" name="Content Placeholder 2"/>
+          <p:cNvSpPr>
+            <a:spLocks noGrp="1"/>
+          </p:cNvSpPr>
+          <p:nvPr>
+            <p:ph idx="1"/>
+          </p:nvPr>
+        </p:nvSpPr>
+        <p:spPr/>
+        <p:txBody>
+          <a:bodyPr/>
+          <a:lstStyle/>
+          <a:p>
+            <a:r>
+              <a:rPr lang="en-US" dirty="0"/>
+              <a:t>Currently, there is driver issues with Raspberry Pi Camera 2 and Motion Library</a:t>
+            </a:r>
+          </a:p>
+          <a:p>
+            <a:r>
+              <a:rPr lang="en-US" dirty="0"/>
+              <a:t>I’ve updated and fixed this in the repo</a:t>
+            </a:r>
+          </a:p>
+          <a:p>
+            <a:r>
+              <a:rPr lang="en-US" dirty="0"/>
+              <a:t>Please Go to Lesson 6 – Drone Car</a:t>
+            </a:r>
+          </a:p>
+          <a:p>
+            <a:pPr lvl="1"/>
+            <a:r>
+              <a:rPr lang="en-US" dirty="0"/>
+              <a:t>ReadMe.txt</a:t>
+            </a:r>
+          </a:p>
+        </p:txBody>
+      </p:sp>
+    </p:spTree>
+    <p:extLst>
+      <p:ext uri="{BB962C8B-B14F-4D97-AF65-F5344CB8AC3E}">
+        <p14:creationId xmlns:p14="http://schemas.microsoft.com/office/powerpoint/2010/main" val="1403893181"/>
       </p:ext>
     </p:extLst>
   </p:cSld>

</xml_diff>